<commit_message>
cmdl exercises pptx and dirs
</commit_message>
<xml_diff>
--- a/slides/ghana_linux_basics.pptx
+++ b/slides/ghana_linux_basics.pptx
@@ -5,7 +5,7 @@
     <p:sldMasterId id="2147483648" r:id="rId1"/>
   </p:sldMasterIdLst>
   <p:notesMasterIdLst>
-    <p:notesMasterId r:id="rId16"/>
+    <p:notesMasterId r:id="rId18"/>
   </p:notesMasterIdLst>
   <p:sldIdLst>
     <p:sldId id="257" r:id="rId2"/>
@@ -21,7 +21,9 @@
     <p:sldId id="278" r:id="rId12"/>
     <p:sldId id="279" r:id="rId13"/>
     <p:sldId id="267" r:id="rId14"/>
-    <p:sldId id="280" r:id="rId15"/>
+    <p:sldId id="281" r:id="rId15"/>
+    <p:sldId id="280" r:id="rId16"/>
+    <p:sldId id="282" r:id="rId17"/>
   </p:sldIdLst>
   <p:sldSz cx="9144000" cy="5143500" type="screen16x9"/>
   <p:notesSz cx="6858000" cy="9144000"/>
@@ -1367,7 +1369,177 @@
     </p:spTree>
     <p:extLst>
       <p:ext uri="{BB962C8B-B14F-4D97-AF65-F5344CB8AC3E}">
+        <p14:creationId xmlns:p14="http://schemas.microsoft.com/office/powerpoint/2010/main" val="1584145284"/>
+      </p:ext>
+    </p:extLst>
+  </p:cSld>
+  <p:clrMapOvr>
+    <a:masterClrMapping/>
+  </p:clrMapOvr>
+</p:notes>
+</file>
+
+<file path=ppt/notesSlides/notesSlide6.xml><?xml version="1.0" encoding="utf-8"?>
+<p:notes xmlns:a="http://schemas.openxmlformats.org/drawingml/2006/main" xmlns:r="http://schemas.openxmlformats.org/officeDocument/2006/relationships" xmlns:p="http://schemas.openxmlformats.org/presentationml/2006/main">
+  <p:cSld>
+    <p:spTree>
+      <p:nvGrpSpPr>
+        <p:cNvPr id="1" name=""/>
+        <p:cNvGrpSpPr/>
+        <p:nvPr/>
+      </p:nvGrpSpPr>
+      <p:grpSpPr>
+        <a:xfrm>
+          <a:off x="0" y="0"/>
+          <a:ext cx="0" cy="0"/>
+          <a:chOff x="0" y="0"/>
+          <a:chExt cx="0" cy="0"/>
+        </a:xfrm>
+      </p:grpSpPr>
+      <p:sp>
+        <p:nvSpPr>
+          <p:cNvPr id="2" name="Slide Image Placeholder 1"/>
+          <p:cNvSpPr>
+            <a:spLocks noGrp="1" noRot="1" noChangeAspect="1"/>
+          </p:cNvSpPr>
+          <p:nvPr>
+            <p:ph type="sldImg"/>
+          </p:nvPr>
+        </p:nvSpPr>
+        <p:spPr/>
+      </p:sp>
+      <p:sp>
+        <p:nvSpPr>
+          <p:cNvPr id="3" name="Notes Placeholder 2"/>
+          <p:cNvSpPr>
+            <a:spLocks noGrp="1"/>
+          </p:cNvSpPr>
+          <p:nvPr>
+            <p:ph type="body" idx="1"/>
+          </p:nvPr>
+        </p:nvSpPr>
+        <p:spPr/>
+        <p:txBody>
+          <a:bodyPr/>
+          <a:lstStyle/>
+          <a:p>
+            <a:endParaRPr lang="en-US" dirty="0"/>
+          </a:p>
+        </p:txBody>
+      </p:sp>
+      <p:sp>
+        <p:nvSpPr>
+          <p:cNvPr id="4" name="Slide Number Placeholder 3"/>
+          <p:cNvSpPr>
+            <a:spLocks noGrp="1"/>
+          </p:cNvSpPr>
+          <p:nvPr>
+            <p:ph type="sldNum" sz="quarter" idx="5"/>
+          </p:nvPr>
+        </p:nvSpPr>
+        <p:spPr/>
+        <p:txBody>
+          <a:bodyPr/>
+          <a:lstStyle/>
+          <a:p>
+            <a:fld id="{EB659993-E3E7-DC47-85F5-E2C9C32D205E}" type="slidenum">
+              <a:rPr lang="de-DE" altLang="de-DE" smtClean="0"/>
+              <a:pPr/>
+              <a:t>14</a:t>
+            </a:fld>
+            <a:endParaRPr lang="de-DE" altLang="de-DE"/>
+          </a:p>
+        </p:txBody>
+      </p:sp>
+    </p:spTree>
+    <p:extLst>
+      <p:ext uri="{BB962C8B-B14F-4D97-AF65-F5344CB8AC3E}">
         <p14:creationId xmlns:p14="http://schemas.microsoft.com/office/powerpoint/2010/main" val="3290303140"/>
+      </p:ext>
+    </p:extLst>
+  </p:cSld>
+  <p:clrMapOvr>
+    <a:masterClrMapping/>
+  </p:clrMapOvr>
+</p:notes>
+</file>
+
+<file path=ppt/notesSlides/notesSlide7.xml><?xml version="1.0" encoding="utf-8"?>
+<p:notes xmlns:a="http://schemas.openxmlformats.org/drawingml/2006/main" xmlns:r="http://schemas.openxmlformats.org/officeDocument/2006/relationships" xmlns:p="http://schemas.openxmlformats.org/presentationml/2006/main">
+  <p:cSld>
+    <p:spTree>
+      <p:nvGrpSpPr>
+        <p:cNvPr id="1" name=""/>
+        <p:cNvGrpSpPr/>
+        <p:nvPr/>
+      </p:nvGrpSpPr>
+      <p:grpSpPr>
+        <a:xfrm>
+          <a:off x="0" y="0"/>
+          <a:ext cx="0" cy="0"/>
+          <a:chOff x="0" y="0"/>
+          <a:chExt cx="0" cy="0"/>
+        </a:xfrm>
+      </p:grpSpPr>
+      <p:sp>
+        <p:nvSpPr>
+          <p:cNvPr id="2" name="Slide Image Placeholder 1"/>
+          <p:cNvSpPr>
+            <a:spLocks noGrp="1" noRot="1" noChangeAspect="1"/>
+          </p:cNvSpPr>
+          <p:nvPr>
+            <p:ph type="sldImg"/>
+          </p:nvPr>
+        </p:nvSpPr>
+        <p:spPr/>
+      </p:sp>
+      <p:sp>
+        <p:nvSpPr>
+          <p:cNvPr id="3" name="Notes Placeholder 2"/>
+          <p:cNvSpPr>
+            <a:spLocks noGrp="1"/>
+          </p:cNvSpPr>
+          <p:nvPr>
+            <p:ph type="body" idx="1"/>
+          </p:nvPr>
+        </p:nvSpPr>
+        <p:spPr/>
+        <p:txBody>
+          <a:bodyPr/>
+          <a:lstStyle/>
+          <a:p>
+            <a:endParaRPr lang="en-US" dirty="0"/>
+          </a:p>
+        </p:txBody>
+      </p:sp>
+      <p:sp>
+        <p:nvSpPr>
+          <p:cNvPr id="4" name="Slide Number Placeholder 3"/>
+          <p:cNvSpPr>
+            <a:spLocks noGrp="1"/>
+          </p:cNvSpPr>
+          <p:nvPr>
+            <p:ph type="sldNum" sz="quarter" idx="5"/>
+          </p:nvPr>
+        </p:nvSpPr>
+        <p:spPr/>
+        <p:txBody>
+          <a:bodyPr/>
+          <a:lstStyle/>
+          <a:p>
+            <a:fld id="{EB659993-E3E7-DC47-85F5-E2C9C32D205E}" type="slidenum">
+              <a:rPr lang="de-DE" altLang="de-DE" smtClean="0"/>
+              <a:pPr/>
+              <a:t>15</a:t>
+            </a:fld>
+            <a:endParaRPr lang="de-DE" altLang="de-DE"/>
+          </a:p>
+        </p:txBody>
+      </p:sp>
+    </p:spTree>
+    <p:extLst>
+      <p:ext uri="{BB962C8B-B14F-4D97-AF65-F5344CB8AC3E}">
+        <p14:creationId xmlns:p14="http://schemas.microsoft.com/office/powerpoint/2010/main" val="2341865236"/>
       </p:ext>
     </p:extLst>
   </p:cSld>
@@ -4817,6 +4989,16 @@
               <a:defRPr/>
             </a:pPr>
             <a:r>
+              <a:rPr lang="de-DE" sz="1313" dirty="0" err="1">
+                <a:solidFill>
+                  <a:srgbClr val="0066CC"/>
+                </a:solidFill>
+                <a:latin typeface="Arial" pitchFamily="34" charset="0"/>
+                <a:cs typeface="Arial" pitchFamily="34" charset="0"/>
+              </a:rPr>
+              <a:t>Bioinformatics</a:t>
+            </a:r>
+            <a:r>
               <a:rPr lang="de-DE" sz="1313" dirty="0">
                 <a:solidFill>
                   <a:srgbClr val="0066CC"/>
@@ -4824,27 +5006,7 @@
                 <a:latin typeface="Arial" pitchFamily="34" charset="0"/>
                 <a:cs typeface="Arial" pitchFamily="34" charset="0"/>
               </a:rPr>
-              <a:t>SEEG </a:t>
-            </a:r>
-            <a:r>
-              <a:rPr lang="de-DE" sz="1313" dirty="0" err="1">
-                <a:solidFill>
-                  <a:srgbClr val="0066CC"/>
-                </a:solidFill>
-                <a:latin typeface="Arial" pitchFamily="34" charset="0"/>
-                <a:cs typeface="Arial" pitchFamily="34" charset="0"/>
-              </a:rPr>
-              <a:t>mission</a:t>
-            </a:r>
-            <a:r>
-              <a:rPr lang="de-DE" sz="1313" dirty="0">
-                <a:solidFill>
-                  <a:srgbClr val="0066CC"/>
-                </a:solidFill>
-                <a:latin typeface="Arial" pitchFamily="34" charset="0"/>
-                <a:cs typeface="Arial" pitchFamily="34" charset="0"/>
-              </a:rPr>
-              <a:t> Assam</a:t>
+              <a:t> Workshop KCCR</a:t>
             </a:r>
           </a:p>
           <a:p>
@@ -4872,7 +5034,7 @@
                 <a:latin typeface="Arial" pitchFamily="34" charset="0"/>
                 <a:cs typeface="Arial" pitchFamily="34" charset="0"/>
               </a:rPr>
-              <a:t>November 2022</a:t>
+              <a:t>August 2023</a:t>
             </a:r>
           </a:p>
         </p:txBody>
@@ -5684,32 +5846,285 @@
           <a:bodyPr/>
           <a:lstStyle/>
           <a:p>
+            <a:pPr marL="457200" indent="-457200">
+              <a:buFont typeface="+mj-lt"/>
+              <a:buAutoNum type="arabicPeriod"/>
+            </a:pPr>
+            <a:r>
+              <a:rPr lang="en-US" sz="2400" dirty="0"/>
+              <a:t>list the content of directory </a:t>
+            </a:r>
+            <a:r>
+              <a:rPr lang="en-US" sz="2400" dirty="0">
+                <a:solidFill>
+                  <a:schemeClr val="accent4"/>
+                </a:solidFill>
+              </a:rPr>
+              <a:t>level_0</a:t>
+            </a:r>
+          </a:p>
+          <a:p>
+            <a:pPr marL="914400" lvl="1" indent="-457200">
+              <a:buFont typeface="+mj-lt"/>
+              <a:buAutoNum type="arabicPeriod"/>
+            </a:pPr>
+            <a:r>
+              <a:rPr lang="en-US" sz="2000" dirty="0"/>
+              <a:t>List the content and write it to a file called </a:t>
+            </a:r>
+            <a:r>
+              <a:rPr lang="en-US" sz="2000" i="1" dirty="0">
+                <a:solidFill>
+                  <a:schemeClr val="accent4"/>
+                </a:solidFill>
+              </a:rPr>
+              <a:t>ls_level_0.txt</a:t>
+            </a:r>
+          </a:p>
+          <a:p>
+            <a:pPr marL="457200" indent="-457200">
+              <a:buFont typeface="+mj-lt"/>
+              <a:buAutoNum type="arabicPeriod"/>
+            </a:pPr>
+            <a:r>
+              <a:rPr lang="en-US" sz="2400" dirty="0"/>
+              <a:t>Try to find the directory level2_dir2 by navigating around with </a:t>
+            </a:r>
+            <a:r>
+              <a:rPr lang="en-US" sz="2400" i="1" dirty="0">
+                <a:solidFill>
+                  <a:schemeClr val="accent4"/>
+                </a:solidFill>
+              </a:rPr>
+              <a:t>cd</a:t>
+            </a:r>
+            <a:r>
+              <a:rPr lang="en-US" sz="2400" dirty="0"/>
+              <a:t> and listing directory content with </a:t>
+            </a:r>
+            <a:r>
+              <a:rPr lang="en-US" sz="2400" i="1" dirty="0">
+                <a:solidFill>
+                  <a:schemeClr val="accent4"/>
+                </a:solidFill>
+              </a:rPr>
+              <a:t>ls</a:t>
+            </a:r>
+          </a:p>
+          <a:p>
+            <a:pPr marL="457200" indent="-457200">
+              <a:buFont typeface="+mj-lt"/>
+              <a:buAutoNum type="arabicPeriod"/>
+            </a:pPr>
+            <a:r>
+              <a:rPr lang="en-US" sz="2400" dirty="0"/>
+              <a:t>When in </a:t>
+            </a:r>
+            <a:r>
+              <a:rPr lang="en-US" sz="2400" dirty="0">
+                <a:solidFill>
+                  <a:schemeClr val="accent4"/>
+                </a:solidFill>
+              </a:rPr>
+              <a:t>level2_dir2</a:t>
+            </a:r>
+            <a:r>
+              <a:rPr lang="en-US" sz="2400" dirty="0"/>
+              <a:t>, list again the content of directory </a:t>
+            </a:r>
+            <a:r>
+              <a:rPr lang="en-US" sz="2400" dirty="0">
+                <a:solidFill>
+                  <a:schemeClr val="accent4"/>
+                </a:solidFill>
+              </a:rPr>
+              <a:t>level_0 </a:t>
+            </a:r>
+            <a:r>
+              <a:rPr lang="en-US" sz="2400" dirty="0"/>
+              <a:t>and write the output into a file within the current working directory</a:t>
+            </a:r>
+          </a:p>
+          <a:p>
+            <a:pPr marL="914400" lvl="1" indent="-457200">
+              <a:buFont typeface="+mj-lt"/>
+              <a:buAutoNum type="arabicPeriod"/>
+            </a:pPr>
+            <a:r>
+              <a:rPr lang="en-US" sz="2000" dirty="0"/>
+              <a:t>Same as above, but write the output into a file in the directory level_1_dir3. First you need to find this directory in the file tree </a:t>
+            </a:r>
+          </a:p>
+          <a:p>
+            <a:pPr marL="1257300" lvl="2" indent="-342900">
+              <a:buFont typeface="+mj-lt"/>
+              <a:buAutoNum type="arabicPeriod"/>
+            </a:pPr>
+            <a:endParaRPr lang="en-US" dirty="0"/>
+          </a:p>
+        </p:txBody>
+      </p:sp>
+    </p:spTree>
+    <p:extLst>
+      <p:ext uri="{BB962C8B-B14F-4D97-AF65-F5344CB8AC3E}">
+        <p14:creationId xmlns:p14="http://schemas.microsoft.com/office/powerpoint/2010/main" val="2531719892"/>
+      </p:ext>
+    </p:extLst>
+  </p:cSld>
+  <p:clrMapOvr>
+    <a:masterClrMapping/>
+  </p:clrMapOvr>
+</p:sld>
+</file>
+
+<file path=ppt/slides/slide15.xml><?xml version="1.0" encoding="utf-8"?>
+<p:sld xmlns:a="http://schemas.openxmlformats.org/drawingml/2006/main" xmlns:r="http://schemas.openxmlformats.org/officeDocument/2006/relationships" xmlns:p="http://schemas.openxmlformats.org/presentationml/2006/main">
+  <p:cSld>
+    <p:spTree>
+      <p:nvGrpSpPr>
+        <p:cNvPr id="1" name=""/>
+        <p:cNvGrpSpPr/>
+        <p:nvPr/>
+      </p:nvGrpSpPr>
+      <p:grpSpPr>
+        <a:xfrm>
+          <a:off x="0" y="0"/>
+          <a:ext cx="0" cy="0"/>
+          <a:chOff x="0" y="0"/>
+          <a:chExt cx="0" cy="0"/>
+        </a:xfrm>
+      </p:grpSpPr>
+      <p:sp>
+        <p:nvSpPr>
+          <p:cNvPr id="2" name="Title 1">
+            <a:extLst>
+              <a:ext uri="{FF2B5EF4-FFF2-40B4-BE49-F238E27FC236}">
+                <a16:creationId xmlns:a16="http://schemas.microsoft.com/office/drawing/2014/main" id="{B85E50DD-72B8-1BF3-5526-083FC2B7BB33}"/>
+              </a:ext>
+            </a:extLst>
+          </p:cNvPr>
+          <p:cNvSpPr>
+            <a:spLocks noGrp="1"/>
+          </p:cNvSpPr>
+          <p:nvPr>
+            <p:ph type="title"/>
+          </p:nvPr>
+        </p:nvSpPr>
+        <p:spPr/>
+        <p:txBody>
+          <a:bodyPr/>
+          <a:lstStyle/>
+          <a:p>
             <a:r>
               <a:rPr lang="en-US" dirty="0"/>
-              <a:t>Create files, folders</a:t>
-            </a:r>
-          </a:p>
-          <a:p>
+              <a:t>Exercises 2</a:t>
+            </a:r>
+            <a:endParaRPr lang="en-DE" dirty="0"/>
+          </a:p>
+        </p:txBody>
+      </p:sp>
+      <p:sp>
+        <p:nvSpPr>
+          <p:cNvPr id="3" name="Content Placeholder 2">
+            <a:extLst>
+              <a:ext uri="{FF2B5EF4-FFF2-40B4-BE49-F238E27FC236}">
+                <a16:creationId xmlns:a16="http://schemas.microsoft.com/office/drawing/2014/main" id="{5E88D3A8-7C27-2898-432C-2321FF6C788B}"/>
+              </a:ext>
+            </a:extLst>
+          </p:cNvPr>
+          <p:cNvSpPr>
+            <a:spLocks noGrp="1"/>
+          </p:cNvSpPr>
+          <p:nvPr>
+            <p:ph idx="1"/>
+          </p:nvPr>
+        </p:nvSpPr>
+        <p:spPr/>
+        <p:txBody>
+          <a:bodyPr/>
+          <a:lstStyle/>
+          <a:p>
+            <a:pPr marL="514350" indent="-514350">
+              <a:buFont typeface="+mj-lt"/>
+              <a:buAutoNum type="arabicPeriod"/>
+            </a:pPr>
             <a:r>
               <a:rPr lang="en-US" dirty="0"/>
-              <a:t>Give relative and absolute paths</a:t>
-            </a:r>
-          </a:p>
-          <a:p>
-            <a:r>
-              <a:rPr lang="en-US" dirty="0" err="1"/>
-              <a:t>stdout</a:t>
-            </a:r>
+              <a:t>Find directory </a:t>
+            </a:r>
+            <a:r>
+              <a:rPr lang="en-US" dirty="0">
+                <a:solidFill>
+                  <a:schemeClr val="accent4"/>
+                </a:solidFill>
+              </a:rPr>
+              <a:t>level3_dir3</a:t>
+            </a:r>
+          </a:p>
+          <a:p>
+            <a:pPr marL="914400" lvl="1" indent="-457200">
+              <a:buFont typeface="+mj-lt"/>
+              <a:buAutoNum type="arabicPeriod"/>
+            </a:pPr>
             <a:r>
               <a:rPr lang="en-US" dirty="0"/>
-              <a:t> and stderr questions on examples</a:t>
-            </a:r>
-          </a:p>
-          <a:p>
+              <a:t>Give the absolute Path of this directory</a:t>
+            </a:r>
+          </a:p>
+          <a:p>
+            <a:pPr marL="914400" lvl="1" indent="-457200">
+              <a:buFont typeface="+mj-lt"/>
+              <a:buAutoNum type="arabicPeriod"/>
+            </a:pPr>
             <a:r>
               <a:rPr lang="en-US" dirty="0"/>
-              <a:t>Pipe with grep</a:t>
-            </a:r>
+              <a:t>Give the relative Path to this directory from </a:t>
+            </a:r>
+            <a:r>
+              <a:rPr lang="en-US" dirty="0">
+                <a:solidFill>
+                  <a:schemeClr val="accent4"/>
+                </a:solidFill>
+              </a:rPr>
+              <a:t>level_0</a:t>
+            </a:r>
+          </a:p>
+          <a:p>
+            <a:pPr marL="914400" lvl="1" indent="-457200">
+              <a:buFont typeface="+mj-lt"/>
+              <a:buAutoNum type="arabicPeriod"/>
+            </a:pPr>
+            <a:r>
+              <a:rPr lang="en-US" dirty="0"/>
+              <a:t>Give the relative Path to this directory from </a:t>
+            </a:r>
+            <a:r>
+              <a:rPr lang="en-US" dirty="0">
+                <a:solidFill>
+                  <a:schemeClr val="accent4"/>
+                </a:solidFill>
+              </a:rPr>
+              <a:t>level_1_dir2</a:t>
+            </a:r>
+          </a:p>
+          <a:p>
+            <a:pPr marL="914400" lvl="1" indent="-457200">
+              <a:buFont typeface="+mj-lt"/>
+              <a:buAutoNum type="arabicPeriod"/>
+            </a:pPr>
+            <a:r>
+              <a:rPr lang="en-US" dirty="0"/>
+              <a:t>Give the absolute Path of </a:t>
+            </a:r>
+            <a:r>
+              <a:rPr lang="en-US" dirty="0">
+                <a:solidFill>
+                  <a:schemeClr val="accent4"/>
+                </a:solidFill>
+              </a:rPr>
+              <a:t>level_1_dir2</a:t>
+            </a:r>
+            <a:endParaRPr lang="en-US" dirty="0"/>
           </a:p>
         </p:txBody>
       </p:sp>
@@ -5717,6 +6132,115 @@
     <p:extLst>
       <p:ext uri="{BB962C8B-B14F-4D97-AF65-F5344CB8AC3E}">
         <p14:creationId xmlns:p14="http://schemas.microsoft.com/office/powerpoint/2010/main" val="3168777734"/>
+      </p:ext>
+    </p:extLst>
+  </p:cSld>
+  <p:clrMapOvr>
+    <a:masterClrMapping/>
+  </p:clrMapOvr>
+</p:sld>
+</file>
+
+<file path=ppt/slides/slide16.xml><?xml version="1.0" encoding="utf-8"?>
+<p:sld xmlns:a="http://schemas.openxmlformats.org/drawingml/2006/main" xmlns:r="http://schemas.openxmlformats.org/officeDocument/2006/relationships" xmlns:p="http://schemas.openxmlformats.org/presentationml/2006/main">
+  <p:cSld>
+    <p:spTree>
+      <p:nvGrpSpPr>
+        <p:cNvPr id="1" name=""/>
+        <p:cNvGrpSpPr/>
+        <p:nvPr/>
+      </p:nvGrpSpPr>
+      <p:grpSpPr>
+        <a:xfrm>
+          <a:off x="0" y="0"/>
+          <a:ext cx="0" cy="0"/>
+          <a:chOff x="0" y="0"/>
+          <a:chExt cx="0" cy="0"/>
+        </a:xfrm>
+      </p:grpSpPr>
+      <p:sp>
+        <p:nvSpPr>
+          <p:cNvPr id="2" name="Title 1">
+            <a:extLst>
+              <a:ext uri="{FF2B5EF4-FFF2-40B4-BE49-F238E27FC236}">
+                <a16:creationId xmlns:a16="http://schemas.microsoft.com/office/drawing/2014/main" id="{B85E50DD-72B8-1BF3-5526-083FC2B7BB33}"/>
+              </a:ext>
+            </a:extLst>
+          </p:cNvPr>
+          <p:cNvSpPr>
+            <a:spLocks noGrp="1"/>
+          </p:cNvSpPr>
+          <p:nvPr>
+            <p:ph type="title"/>
+          </p:nvPr>
+        </p:nvSpPr>
+        <p:spPr/>
+        <p:txBody>
+          <a:bodyPr/>
+          <a:lstStyle/>
+          <a:p>
+            <a:r>
+              <a:rPr lang="en-US" dirty="0"/>
+              <a:t>Exercises</a:t>
+            </a:r>
+            <a:endParaRPr lang="en-DE" dirty="0"/>
+          </a:p>
+        </p:txBody>
+      </p:sp>
+      <p:sp>
+        <p:nvSpPr>
+          <p:cNvPr id="3" name="Content Placeholder 2">
+            <a:extLst>
+              <a:ext uri="{FF2B5EF4-FFF2-40B4-BE49-F238E27FC236}">
+                <a16:creationId xmlns:a16="http://schemas.microsoft.com/office/drawing/2014/main" id="{5E88D3A8-7C27-2898-432C-2321FF6C788B}"/>
+              </a:ext>
+            </a:extLst>
+          </p:cNvPr>
+          <p:cNvSpPr>
+            <a:spLocks noGrp="1"/>
+          </p:cNvSpPr>
+          <p:nvPr>
+            <p:ph idx="1"/>
+          </p:nvPr>
+        </p:nvSpPr>
+        <p:spPr/>
+        <p:txBody>
+          <a:bodyPr/>
+          <a:lstStyle/>
+          <a:p>
+            <a:r>
+              <a:rPr lang="en-US" dirty="0"/>
+              <a:t>Create files, folders</a:t>
+            </a:r>
+          </a:p>
+          <a:p>
+            <a:r>
+              <a:rPr lang="en-US" dirty="0"/>
+              <a:t>Give relative and absolute paths</a:t>
+            </a:r>
+          </a:p>
+          <a:p>
+            <a:r>
+              <a:rPr lang="en-US" dirty="0" err="1"/>
+              <a:t>stdout</a:t>
+            </a:r>
+            <a:r>
+              <a:rPr lang="en-US" dirty="0"/>
+              <a:t> and stderr questions on examples</a:t>
+            </a:r>
+          </a:p>
+          <a:p>
+            <a:r>
+              <a:rPr lang="en-US" dirty="0"/>
+              <a:t>Pipe with grep</a:t>
+            </a:r>
+          </a:p>
+        </p:txBody>
+      </p:sp>
+    </p:spTree>
+    <p:extLst>
+      <p:ext uri="{BB962C8B-B14F-4D97-AF65-F5344CB8AC3E}">
+        <p14:creationId xmlns:p14="http://schemas.microsoft.com/office/powerpoint/2010/main" val="2336104159"/>
       </p:ext>
     </p:extLst>
   </p:cSld>
@@ -7306,6 +7830,16 @@
             <a:r>
               <a:rPr lang="en-US" dirty="0"/>
               <a:t>The cd command</a:t>
+            </a:r>
+          </a:p>
+          <a:p>
+            <a:r>
+              <a:rPr lang="en-US" dirty="0" err="1"/>
+              <a:t>pwd</a:t>
+            </a:r>
+            <a:r>
+              <a:rPr lang="en-US" dirty="0"/>
+              <a:t> (print working directory)</a:t>
             </a:r>
           </a:p>
           <a:p>

</xml_diff>

<commit_message>
added to linux slides
</commit_message>
<xml_diff>
--- a/slides/ghana_linux_basics.pptx
+++ b/slides/ghana_linux_basics.pptx
@@ -5,7 +5,7 @@
     <p:sldMasterId id="2147483648" r:id="rId1"/>
   </p:sldMasterIdLst>
   <p:notesMasterIdLst>
-    <p:notesMasterId r:id="rId18"/>
+    <p:notesMasterId r:id="rId25"/>
   </p:notesMasterIdLst>
   <p:sldIdLst>
     <p:sldId id="257" r:id="rId2"/>
@@ -24,6 +24,13 @@
     <p:sldId id="281" r:id="rId15"/>
     <p:sldId id="280" r:id="rId16"/>
     <p:sldId id="282" r:id="rId17"/>
+    <p:sldId id="283" r:id="rId18"/>
+    <p:sldId id="284" r:id="rId19"/>
+    <p:sldId id="289" r:id="rId20"/>
+    <p:sldId id="285" r:id="rId21"/>
+    <p:sldId id="286" r:id="rId22"/>
+    <p:sldId id="287" r:id="rId23"/>
+    <p:sldId id="288" r:id="rId24"/>
   </p:sldIdLst>
   <p:sldSz cx="9144000" cy="5143500" type="screen16x9"/>
   <p:notesSz cx="6858000" cy="9144000"/>
@@ -1039,6 +1046,91 @@
 </p:notes>
 </file>
 
+<file path=ppt/notesSlides/notesSlide10.xml><?xml version="1.0" encoding="utf-8"?>
+<p:notes xmlns:a="http://schemas.openxmlformats.org/drawingml/2006/main" xmlns:r="http://schemas.openxmlformats.org/officeDocument/2006/relationships" xmlns:p="http://schemas.openxmlformats.org/presentationml/2006/main">
+  <p:cSld>
+    <p:spTree>
+      <p:nvGrpSpPr>
+        <p:cNvPr id="1" name=""/>
+        <p:cNvGrpSpPr/>
+        <p:nvPr/>
+      </p:nvGrpSpPr>
+      <p:grpSpPr>
+        <a:xfrm>
+          <a:off x="0" y="0"/>
+          <a:ext cx="0" cy="0"/>
+          <a:chOff x="0" y="0"/>
+          <a:chExt cx="0" cy="0"/>
+        </a:xfrm>
+      </p:grpSpPr>
+      <p:sp>
+        <p:nvSpPr>
+          <p:cNvPr id="2" name="Slide Image Placeholder 1"/>
+          <p:cNvSpPr>
+            <a:spLocks noGrp="1" noRot="1" noChangeAspect="1"/>
+          </p:cNvSpPr>
+          <p:nvPr>
+            <p:ph type="sldImg"/>
+          </p:nvPr>
+        </p:nvSpPr>
+        <p:spPr/>
+      </p:sp>
+      <p:sp>
+        <p:nvSpPr>
+          <p:cNvPr id="3" name="Notes Placeholder 2"/>
+          <p:cNvSpPr>
+            <a:spLocks noGrp="1"/>
+          </p:cNvSpPr>
+          <p:nvPr>
+            <p:ph type="body" idx="1"/>
+          </p:nvPr>
+        </p:nvSpPr>
+        <p:spPr/>
+        <p:txBody>
+          <a:bodyPr/>
+          <a:lstStyle/>
+          <a:p>
+            <a:endParaRPr lang="en-US" dirty="0"/>
+          </a:p>
+        </p:txBody>
+      </p:sp>
+      <p:sp>
+        <p:nvSpPr>
+          <p:cNvPr id="4" name="Slide Number Placeholder 3"/>
+          <p:cNvSpPr>
+            <a:spLocks noGrp="1"/>
+          </p:cNvSpPr>
+          <p:nvPr>
+            <p:ph type="sldNum" sz="quarter" idx="5"/>
+          </p:nvPr>
+        </p:nvSpPr>
+        <p:spPr/>
+        <p:txBody>
+          <a:bodyPr/>
+          <a:lstStyle/>
+          <a:p>
+            <a:fld id="{EB659993-E3E7-DC47-85F5-E2C9C32D205E}" type="slidenum">
+              <a:rPr lang="de-DE" altLang="de-DE" smtClean="0"/>
+              <a:pPr/>
+              <a:t>18</a:t>
+            </a:fld>
+            <a:endParaRPr lang="de-DE" altLang="de-DE"/>
+          </a:p>
+        </p:txBody>
+      </p:sp>
+    </p:spTree>
+    <p:extLst>
+      <p:ext uri="{BB962C8B-B14F-4D97-AF65-F5344CB8AC3E}">
+        <p14:creationId xmlns:p14="http://schemas.microsoft.com/office/powerpoint/2010/main" val="520158969"/>
+      </p:ext>
+    </p:extLst>
+  </p:cSld>
+  <p:clrMapOvr>
+    <a:masterClrMapping/>
+  </p:clrMapOvr>
+</p:notes>
+</file>
+
 <file path=ppt/notesSlides/notesSlide2.xml><?xml version="1.0" encoding="utf-8"?>
 <p:notes xmlns:a="http://schemas.openxmlformats.org/drawingml/2006/main" xmlns:r="http://schemas.openxmlformats.org/officeDocument/2006/relationships" xmlns:p="http://schemas.openxmlformats.org/presentationml/2006/main">
   <p:cSld>
@@ -1540,6 +1632,176 @@
     <p:extLst>
       <p:ext uri="{BB962C8B-B14F-4D97-AF65-F5344CB8AC3E}">
         <p14:creationId xmlns:p14="http://schemas.microsoft.com/office/powerpoint/2010/main" val="2341865236"/>
+      </p:ext>
+    </p:extLst>
+  </p:cSld>
+  <p:clrMapOvr>
+    <a:masterClrMapping/>
+  </p:clrMapOvr>
+</p:notes>
+</file>
+
+<file path=ppt/notesSlides/notesSlide8.xml><?xml version="1.0" encoding="utf-8"?>
+<p:notes xmlns:a="http://schemas.openxmlformats.org/drawingml/2006/main" xmlns:r="http://schemas.openxmlformats.org/officeDocument/2006/relationships" xmlns:p="http://schemas.openxmlformats.org/presentationml/2006/main">
+  <p:cSld>
+    <p:spTree>
+      <p:nvGrpSpPr>
+        <p:cNvPr id="1" name=""/>
+        <p:cNvGrpSpPr/>
+        <p:nvPr/>
+      </p:nvGrpSpPr>
+      <p:grpSpPr>
+        <a:xfrm>
+          <a:off x="0" y="0"/>
+          <a:ext cx="0" cy="0"/>
+          <a:chOff x="0" y="0"/>
+          <a:chExt cx="0" cy="0"/>
+        </a:xfrm>
+      </p:grpSpPr>
+      <p:sp>
+        <p:nvSpPr>
+          <p:cNvPr id="2" name="Slide Image Placeholder 1"/>
+          <p:cNvSpPr>
+            <a:spLocks noGrp="1" noRot="1" noChangeAspect="1"/>
+          </p:cNvSpPr>
+          <p:nvPr>
+            <p:ph type="sldImg"/>
+          </p:nvPr>
+        </p:nvSpPr>
+        <p:spPr/>
+      </p:sp>
+      <p:sp>
+        <p:nvSpPr>
+          <p:cNvPr id="3" name="Notes Placeholder 2"/>
+          <p:cNvSpPr>
+            <a:spLocks noGrp="1"/>
+          </p:cNvSpPr>
+          <p:nvPr>
+            <p:ph type="body" idx="1"/>
+          </p:nvPr>
+        </p:nvSpPr>
+        <p:spPr/>
+        <p:txBody>
+          <a:bodyPr/>
+          <a:lstStyle/>
+          <a:p>
+            <a:endParaRPr lang="en-US" dirty="0"/>
+          </a:p>
+        </p:txBody>
+      </p:sp>
+      <p:sp>
+        <p:nvSpPr>
+          <p:cNvPr id="4" name="Slide Number Placeholder 3"/>
+          <p:cNvSpPr>
+            <a:spLocks noGrp="1"/>
+          </p:cNvSpPr>
+          <p:nvPr>
+            <p:ph type="sldNum" sz="quarter" idx="5"/>
+          </p:nvPr>
+        </p:nvSpPr>
+        <p:spPr/>
+        <p:txBody>
+          <a:bodyPr/>
+          <a:lstStyle/>
+          <a:p>
+            <a:fld id="{EB659993-E3E7-DC47-85F5-E2C9C32D205E}" type="slidenum">
+              <a:rPr lang="de-DE" altLang="de-DE" smtClean="0"/>
+              <a:pPr/>
+              <a:t>16</a:t>
+            </a:fld>
+            <a:endParaRPr lang="de-DE" altLang="de-DE"/>
+          </a:p>
+        </p:txBody>
+      </p:sp>
+    </p:spTree>
+    <p:extLst>
+      <p:ext uri="{BB962C8B-B14F-4D97-AF65-F5344CB8AC3E}">
+        <p14:creationId xmlns:p14="http://schemas.microsoft.com/office/powerpoint/2010/main" val="2028849296"/>
+      </p:ext>
+    </p:extLst>
+  </p:cSld>
+  <p:clrMapOvr>
+    <a:masterClrMapping/>
+  </p:clrMapOvr>
+</p:notes>
+</file>
+
+<file path=ppt/notesSlides/notesSlide9.xml><?xml version="1.0" encoding="utf-8"?>
+<p:notes xmlns:a="http://schemas.openxmlformats.org/drawingml/2006/main" xmlns:r="http://schemas.openxmlformats.org/officeDocument/2006/relationships" xmlns:p="http://schemas.openxmlformats.org/presentationml/2006/main">
+  <p:cSld>
+    <p:spTree>
+      <p:nvGrpSpPr>
+        <p:cNvPr id="1" name=""/>
+        <p:cNvGrpSpPr/>
+        <p:nvPr/>
+      </p:nvGrpSpPr>
+      <p:grpSpPr>
+        <a:xfrm>
+          <a:off x="0" y="0"/>
+          <a:ext cx="0" cy="0"/>
+          <a:chOff x="0" y="0"/>
+          <a:chExt cx="0" cy="0"/>
+        </a:xfrm>
+      </p:grpSpPr>
+      <p:sp>
+        <p:nvSpPr>
+          <p:cNvPr id="2" name="Slide Image Placeholder 1"/>
+          <p:cNvSpPr>
+            <a:spLocks noGrp="1" noRot="1" noChangeAspect="1"/>
+          </p:cNvSpPr>
+          <p:nvPr>
+            <p:ph type="sldImg"/>
+          </p:nvPr>
+        </p:nvSpPr>
+        <p:spPr/>
+      </p:sp>
+      <p:sp>
+        <p:nvSpPr>
+          <p:cNvPr id="3" name="Notes Placeholder 2"/>
+          <p:cNvSpPr>
+            <a:spLocks noGrp="1"/>
+          </p:cNvSpPr>
+          <p:nvPr>
+            <p:ph type="body" idx="1"/>
+          </p:nvPr>
+        </p:nvSpPr>
+        <p:spPr/>
+        <p:txBody>
+          <a:bodyPr/>
+          <a:lstStyle/>
+          <a:p>
+            <a:endParaRPr lang="en-US" dirty="0"/>
+          </a:p>
+        </p:txBody>
+      </p:sp>
+      <p:sp>
+        <p:nvSpPr>
+          <p:cNvPr id="4" name="Slide Number Placeholder 3"/>
+          <p:cNvSpPr>
+            <a:spLocks noGrp="1"/>
+          </p:cNvSpPr>
+          <p:nvPr>
+            <p:ph type="sldNum" sz="quarter" idx="5"/>
+          </p:nvPr>
+        </p:nvSpPr>
+        <p:spPr/>
+        <p:txBody>
+          <a:bodyPr/>
+          <a:lstStyle/>
+          <a:p>
+            <a:fld id="{EB659993-E3E7-DC47-85F5-E2C9C32D205E}" type="slidenum">
+              <a:rPr lang="de-DE" altLang="de-DE" smtClean="0"/>
+              <a:pPr/>
+              <a:t>17</a:t>
+            </a:fld>
+            <a:endParaRPr lang="de-DE" altLang="de-DE"/>
+          </a:p>
+        </p:txBody>
+      </p:sp>
+    </p:spTree>
+    <p:extLst>
+      <p:ext uri="{BB962C8B-B14F-4D97-AF65-F5344CB8AC3E}">
+        <p14:creationId xmlns:p14="http://schemas.microsoft.com/office/powerpoint/2010/main" val="1384758028"/>
       </p:ext>
     </p:extLst>
   </p:cSld>
@@ -6106,9 +6368,10 @@
               </a:rPr>
               <a:t>level_1_dir2</a:t>
             </a:r>
-          </a:p>
-          <a:p>
-            <a:pPr marL="914400" lvl="1" indent="-457200">
+            <a:endParaRPr lang="en-US" dirty="0"/>
+          </a:p>
+          <a:p>
+            <a:pPr marL="514350" indent="-457200">
               <a:buFont typeface="+mj-lt"/>
               <a:buAutoNum type="arabicPeriod"/>
             </a:pPr>
@@ -6181,7 +6444,7 @@
           <a:p>
             <a:r>
               <a:rPr lang="en-US" dirty="0"/>
-              <a:t>Exercises</a:t>
+              <a:t>Tools to find stuff</a:t>
             </a:r>
             <a:endParaRPr lang="en-DE" dirty="0"/>
           </a:p>
@@ -6210,29 +6473,13 @@
           <a:p>
             <a:r>
               <a:rPr lang="en-US" dirty="0"/>
-              <a:t>Create files, folders</a:t>
-            </a:r>
-          </a:p>
-          <a:p>
-            <a:r>
-              <a:rPr lang="en-US" dirty="0"/>
-              <a:t>Give relative and absolute paths</a:t>
-            </a:r>
-          </a:p>
-          <a:p>
-            <a:r>
-              <a:rPr lang="en-US" dirty="0" err="1"/>
-              <a:t>stdout</a:t>
-            </a:r>
-            <a:r>
-              <a:rPr lang="en-US" dirty="0"/>
-              <a:t> and stderr questions on examples</a:t>
-            </a:r>
-          </a:p>
-          <a:p>
-            <a:r>
-              <a:rPr lang="en-US" dirty="0"/>
-              <a:t>Pipe with grep</a:t>
+              <a:t>grep</a:t>
+            </a:r>
+          </a:p>
+          <a:p>
+            <a:r>
+              <a:rPr lang="en-US" dirty="0"/>
+              <a:t>find</a:t>
             </a:r>
           </a:p>
         </p:txBody>
@@ -6241,6 +6488,834 @@
     <p:extLst>
       <p:ext uri="{BB962C8B-B14F-4D97-AF65-F5344CB8AC3E}">
         <p14:creationId xmlns:p14="http://schemas.microsoft.com/office/powerpoint/2010/main" val="2336104159"/>
+      </p:ext>
+    </p:extLst>
+  </p:cSld>
+  <p:clrMapOvr>
+    <a:masterClrMapping/>
+  </p:clrMapOvr>
+</p:sld>
+</file>
+
+<file path=ppt/slides/slide17.xml><?xml version="1.0" encoding="utf-8"?>
+<p:sld xmlns:a="http://schemas.openxmlformats.org/drawingml/2006/main" xmlns:r="http://schemas.openxmlformats.org/officeDocument/2006/relationships" xmlns:p="http://schemas.openxmlformats.org/presentationml/2006/main">
+  <p:cSld>
+    <p:spTree>
+      <p:nvGrpSpPr>
+        <p:cNvPr id="1" name=""/>
+        <p:cNvGrpSpPr/>
+        <p:nvPr/>
+      </p:nvGrpSpPr>
+      <p:grpSpPr>
+        <a:xfrm>
+          <a:off x="0" y="0"/>
+          <a:ext cx="0" cy="0"/>
+          <a:chOff x="0" y="0"/>
+          <a:chExt cx="0" cy="0"/>
+        </a:xfrm>
+      </p:grpSpPr>
+      <p:sp>
+        <p:nvSpPr>
+          <p:cNvPr id="2" name="Title 1">
+            <a:extLst>
+              <a:ext uri="{FF2B5EF4-FFF2-40B4-BE49-F238E27FC236}">
+                <a16:creationId xmlns:a16="http://schemas.microsoft.com/office/drawing/2014/main" id="{B85E50DD-72B8-1BF3-5526-083FC2B7BB33}"/>
+              </a:ext>
+            </a:extLst>
+          </p:cNvPr>
+          <p:cNvSpPr>
+            <a:spLocks noGrp="1"/>
+          </p:cNvSpPr>
+          <p:nvPr>
+            <p:ph type="title"/>
+          </p:nvPr>
+        </p:nvSpPr>
+        <p:spPr>
+          <a:xfrm>
+            <a:off x="250825" y="62830"/>
+            <a:ext cx="8642350" cy="420688"/>
+          </a:xfrm>
+        </p:spPr>
+        <p:txBody>
+          <a:bodyPr/>
+          <a:lstStyle/>
+          <a:p>
+            <a:r>
+              <a:rPr lang="en-US" dirty="0"/>
+              <a:t>Tools to find stuff - grep</a:t>
+            </a:r>
+            <a:endParaRPr lang="en-DE" dirty="0"/>
+          </a:p>
+        </p:txBody>
+      </p:sp>
+      <p:sp>
+        <p:nvSpPr>
+          <p:cNvPr id="3" name="Content Placeholder 2">
+            <a:extLst>
+              <a:ext uri="{FF2B5EF4-FFF2-40B4-BE49-F238E27FC236}">
+                <a16:creationId xmlns:a16="http://schemas.microsoft.com/office/drawing/2014/main" id="{5E88D3A8-7C27-2898-432C-2321FF6C788B}"/>
+              </a:ext>
+            </a:extLst>
+          </p:cNvPr>
+          <p:cNvSpPr>
+            <a:spLocks noGrp="1"/>
+          </p:cNvSpPr>
+          <p:nvPr>
+            <p:ph idx="1"/>
+          </p:nvPr>
+        </p:nvSpPr>
+        <p:spPr>
+          <a:xfrm>
+            <a:off x="250825" y="627534"/>
+            <a:ext cx="8642350" cy="3635375"/>
+          </a:xfrm>
+        </p:spPr>
+        <p:txBody>
+          <a:bodyPr/>
+          <a:lstStyle/>
+          <a:p>
+            <a:r>
+              <a:rPr lang="en-US" dirty="0"/>
+              <a:t>grep (</a:t>
+            </a:r>
+            <a:r>
+              <a:rPr lang="en-GB" b="1" i="0" dirty="0">
+                <a:solidFill>
+                  <a:srgbClr val="313131"/>
+                </a:solidFill>
+                <a:effectLst/>
+                <a:latin typeface="Open Sans" panose="020B0606030504020204" pitchFamily="34" charset="0"/>
+              </a:rPr>
+              <a:t>G</a:t>
+            </a:r>
+            <a:r>
+              <a:rPr lang="en-GB" b="0" i="0" dirty="0">
+                <a:solidFill>
+                  <a:srgbClr val="313131"/>
+                </a:solidFill>
+                <a:effectLst/>
+                <a:latin typeface="Open Sans" panose="020B0606030504020204" pitchFamily="34" charset="0"/>
+              </a:rPr>
+              <a:t>lobal </a:t>
+            </a:r>
+            <a:r>
+              <a:rPr lang="en-GB" b="1" i="0" dirty="0">
+                <a:solidFill>
+                  <a:srgbClr val="313131"/>
+                </a:solidFill>
+                <a:effectLst/>
+                <a:latin typeface="Open Sans" panose="020B0606030504020204" pitchFamily="34" charset="0"/>
+              </a:rPr>
+              <a:t>r</a:t>
+            </a:r>
+            <a:r>
+              <a:rPr lang="en-GB" b="0" i="0" dirty="0">
+                <a:solidFill>
+                  <a:srgbClr val="313131"/>
+                </a:solidFill>
+                <a:effectLst/>
+                <a:latin typeface="Open Sans" panose="020B0606030504020204" pitchFamily="34" charset="0"/>
+              </a:rPr>
+              <a:t>egular </a:t>
+            </a:r>
+            <a:r>
+              <a:rPr lang="en-GB" b="1" i="0" dirty="0">
+                <a:solidFill>
+                  <a:srgbClr val="313131"/>
+                </a:solidFill>
+                <a:effectLst/>
+                <a:latin typeface="Open Sans" panose="020B0606030504020204" pitchFamily="34" charset="0"/>
+              </a:rPr>
+              <a:t>e</a:t>
+            </a:r>
+            <a:r>
+              <a:rPr lang="en-GB" b="0" i="0" dirty="0">
+                <a:solidFill>
+                  <a:srgbClr val="313131"/>
+                </a:solidFill>
+                <a:effectLst/>
+                <a:latin typeface="Open Sans" panose="020B0606030504020204" pitchFamily="34" charset="0"/>
+              </a:rPr>
+              <a:t>xpression </a:t>
+            </a:r>
+            <a:r>
+              <a:rPr lang="en-GB" b="1" i="0" dirty="0">
+                <a:solidFill>
+                  <a:srgbClr val="313131"/>
+                </a:solidFill>
+                <a:effectLst/>
+                <a:latin typeface="Open Sans" panose="020B0606030504020204" pitchFamily="34" charset="0"/>
+              </a:rPr>
+              <a:t>p</a:t>
+            </a:r>
+            <a:r>
+              <a:rPr lang="en-GB" b="0" i="0" dirty="0">
+                <a:solidFill>
+                  <a:srgbClr val="313131"/>
+                </a:solidFill>
+                <a:effectLst/>
+                <a:latin typeface="Open Sans" panose="020B0606030504020204" pitchFamily="34" charset="0"/>
+              </a:rPr>
+              <a:t>rint)</a:t>
+            </a:r>
+            <a:endParaRPr lang="en-US" dirty="0"/>
+          </a:p>
+          <a:p>
+            <a:r>
+              <a:rPr lang="en-US" dirty="0"/>
+              <a:t>searches for ”patterns” within in a file</a:t>
+            </a:r>
+          </a:p>
+          <a:p>
+            <a:r>
+              <a:rPr lang="en-US" dirty="0"/>
+              <a:t>grep pattern </a:t>
+            </a:r>
+            <a:r>
+              <a:rPr lang="en-US" dirty="0" err="1"/>
+              <a:t>file_name</a:t>
+            </a:r>
+            <a:endParaRPr lang="en-US" dirty="0"/>
+          </a:p>
+          <a:p>
+            <a:pPr lvl="1"/>
+            <a:r>
+              <a:rPr lang="en-US" dirty="0" err="1"/>
+              <a:t>e.g</a:t>
+            </a:r>
+            <a:r>
+              <a:rPr lang="en-US" dirty="0"/>
+              <a:t> </a:t>
+            </a:r>
+            <a:r>
+              <a:rPr lang="en-US" dirty="0">
+                <a:solidFill>
+                  <a:schemeClr val="accent4"/>
+                </a:solidFill>
+              </a:rPr>
+              <a:t>grep ATGC </a:t>
+            </a:r>
+            <a:r>
+              <a:rPr lang="en-US" dirty="0" err="1">
+                <a:solidFill>
+                  <a:schemeClr val="accent4"/>
+                </a:solidFill>
+              </a:rPr>
+              <a:t>my_sample.fastq</a:t>
+            </a:r>
+            <a:endParaRPr lang="en-US" dirty="0">
+              <a:solidFill>
+                <a:schemeClr val="accent4"/>
+              </a:solidFill>
+            </a:endParaRPr>
+          </a:p>
+          <a:p>
+            <a:r>
+              <a:rPr lang="en-US" dirty="0"/>
+              <a:t>”pattern” can be a lot of things</a:t>
+            </a:r>
+          </a:p>
+          <a:p>
+            <a:pPr lvl="1"/>
+            <a:r>
+              <a:rPr lang="en-US" dirty="0">
+                <a:solidFill>
+                  <a:schemeClr val="accent4"/>
+                </a:solidFill>
+              </a:rPr>
+              <a:t>“^hepatitis”</a:t>
+            </a:r>
+            <a:r>
+              <a:rPr lang="en-US" dirty="0"/>
+              <a:t> </a:t>
+            </a:r>
+            <a:r>
+              <a:rPr lang="en-US" dirty="0">
+                <a:sym typeface="Wingdings" pitchFamily="2" charset="2"/>
+              </a:rPr>
+              <a:t> line starts with “hepatitis”</a:t>
+            </a:r>
+          </a:p>
+          <a:p>
+            <a:pPr lvl="1"/>
+            <a:r>
+              <a:rPr lang="en-US" dirty="0">
+                <a:solidFill>
+                  <a:schemeClr val="accent4"/>
+                </a:solidFill>
+                <a:sym typeface="Wingdings" pitchFamily="2" charset="2"/>
+              </a:rPr>
+              <a:t>“hepatitis$” </a:t>
+            </a:r>
+            <a:r>
+              <a:rPr lang="en-US" dirty="0">
+                <a:sym typeface="Wingdings" pitchFamily="2" charset="2"/>
+              </a:rPr>
+              <a:t> line ends with hepatitis</a:t>
+            </a:r>
+          </a:p>
+          <a:p>
+            <a:pPr lvl="1"/>
+            <a:r>
+              <a:rPr lang="en-US" dirty="0">
+                <a:sym typeface="Wingdings" pitchFamily="2" charset="2"/>
+              </a:rPr>
+              <a:t>(or a regular expression when using </a:t>
+            </a:r>
+            <a:r>
+              <a:rPr lang="en-US" dirty="0">
+                <a:solidFill>
+                  <a:schemeClr val="accent4"/>
+                </a:solidFill>
+                <a:sym typeface="Wingdings" pitchFamily="2" charset="2"/>
+              </a:rPr>
+              <a:t>grep -E</a:t>
+            </a:r>
+            <a:r>
+              <a:rPr lang="en-US" dirty="0">
+                <a:sym typeface="Wingdings" pitchFamily="2" charset="2"/>
+              </a:rPr>
+              <a:t> or </a:t>
+            </a:r>
+            <a:r>
+              <a:rPr lang="en-US" dirty="0" err="1">
+                <a:solidFill>
+                  <a:schemeClr val="accent4"/>
+                </a:solidFill>
+                <a:sym typeface="Wingdings" pitchFamily="2" charset="2"/>
+              </a:rPr>
+              <a:t>egrep</a:t>
+            </a:r>
+            <a:r>
+              <a:rPr lang="en-US" dirty="0">
+                <a:sym typeface="Wingdings" pitchFamily="2" charset="2"/>
+              </a:rPr>
+              <a:t>)</a:t>
+            </a:r>
+            <a:br>
+              <a:rPr lang="en-US" dirty="0">
+                <a:sym typeface="Wingdings" pitchFamily="2" charset="2"/>
+              </a:rPr>
+            </a:br>
+            <a:r>
+              <a:rPr lang="en-US" dirty="0">
+                <a:sym typeface="Wingdings" pitchFamily="2" charset="2"/>
+              </a:rPr>
+              <a:t>more info </a:t>
+            </a:r>
+            <a:r>
+              <a:rPr lang="en-US" dirty="0">
+                <a:sym typeface="Wingdings" pitchFamily="2" charset="2"/>
+                <a:hlinkClick r:id="rId3"/>
+              </a:rPr>
+              <a:t>here</a:t>
+            </a:r>
+            <a:endParaRPr lang="en-US" dirty="0"/>
+          </a:p>
+          <a:p>
+            <a:endParaRPr lang="en-US" dirty="0"/>
+          </a:p>
+        </p:txBody>
+      </p:sp>
+    </p:spTree>
+    <p:extLst>
+      <p:ext uri="{BB962C8B-B14F-4D97-AF65-F5344CB8AC3E}">
+        <p14:creationId xmlns:p14="http://schemas.microsoft.com/office/powerpoint/2010/main" val="460559445"/>
+      </p:ext>
+    </p:extLst>
+  </p:cSld>
+  <p:clrMapOvr>
+    <a:masterClrMapping/>
+  </p:clrMapOvr>
+</p:sld>
+</file>
+
+<file path=ppt/slides/slide18.xml><?xml version="1.0" encoding="utf-8"?>
+<p:sld xmlns:a="http://schemas.openxmlformats.org/drawingml/2006/main" xmlns:r="http://schemas.openxmlformats.org/officeDocument/2006/relationships" xmlns:p="http://schemas.openxmlformats.org/presentationml/2006/main">
+  <p:cSld>
+    <p:spTree>
+      <p:nvGrpSpPr>
+        <p:cNvPr id="1" name=""/>
+        <p:cNvGrpSpPr/>
+        <p:nvPr/>
+      </p:nvGrpSpPr>
+      <p:grpSpPr>
+        <a:xfrm>
+          <a:off x="0" y="0"/>
+          <a:ext cx="0" cy="0"/>
+          <a:chOff x="0" y="0"/>
+          <a:chExt cx="0" cy="0"/>
+        </a:xfrm>
+      </p:grpSpPr>
+      <p:sp>
+        <p:nvSpPr>
+          <p:cNvPr id="2" name="Title 1">
+            <a:extLst>
+              <a:ext uri="{FF2B5EF4-FFF2-40B4-BE49-F238E27FC236}">
+                <a16:creationId xmlns:a16="http://schemas.microsoft.com/office/drawing/2014/main" id="{B85E50DD-72B8-1BF3-5526-083FC2B7BB33}"/>
+              </a:ext>
+            </a:extLst>
+          </p:cNvPr>
+          <p:cNvSpPr>
+            <a:spLocks noGrp="1"/>
+          </p:cNvSpPr>
+          <p:nvPr>
+            <p:ph type="title"/>
+          </p:nvPr>
+        </p:nvSpPr>
+        <p:spPr>
+          <a:xfrm>
+            <a:off x="250825" y="62830"/>
+            <a:ext cx="8642350" cy="420688"/>
+          </a:xfrm>
+        </p:spPr>
+        <p:txBody>
+          <a:bodyPr/>
+          <a:lstStyle/>
+          <a:p>
+            <a:r>
+              <a:rPr lang="en-US" dirty="0"/>
+              <a:t>Tools to find stuff - grep</a:t>
+            </a:r>
+            <a:endParaRPr lang="en-DE" dirty="0"/>
+          </a:p>
+        </p:txBody>
+      </p:sp>
+      <p:sp>
+        <p:nvSpPr>
+          <p:cNvPr id="3" name="Content Placeholder 2">
+            <a:extLst>
+              <a:ext uri="{FF2B5EF4-FFF2-40B4-BE49-F238E27FC236}">
+                <a16:creationId xmlns:a16="http://schemas.microsoft.com/office/drawing/2014/main" id="{5E88D3A8-7C27-2898-432C-2321FF6C788B}"/>
+              </a:ext>
+            </a:extLst>
+          </p:cNvPr>
+          <p:cNvSpPr>
+            <a:spLocks noGrp="1"/>
+          </p:cNvSpPr>
+          <p:nvPr>
+            <p:ph idx="1"/>
+          </p:nvPr>
+        </p:nvSpPr>
+        <p:spPr>
+          <a:xfrm>
+            <a:off x="250825" y="627534"/>
+            <a:ext cx="8642350" cy="3635375"/>
+          </a:xfrm>
+        </p:spPr>
+        <p:txBody>
+          <a:bodyPr/>
+          <a:lstStyle/>
+          <a:p>
+            <a:r>
+              <a:rPr lang="en-US" dirty="0"/>
+              <a:t> </a:t>
+            </a:r>
+            <a:r>
+              <a:rPr lang="en-US" sz="2400" dirty="0">
+                <a:solidFill>
+                  <a:schemeClr val="accent4"/>
+                </a:solidFill>
+              </a:rPr>
+              <a:t>grep -</a:t>
+            </a:r>
+            <a:r>
+              <a:rPr lang="en-US" sz="2400" dirty="0" err="1">
+                <a:solidFill>
+                  <a:schemeClr val="accent4"/>
+                </a:solidFill>
+              </a:rPr>
+              <a:t>i</a:t>
+            </a:r>
+            <a:r>
+              <a:rPr lang="en-US" sz="2400" dirty="0"/>
+              <a:t> </a:t>
+            </a:r>
+            <a:r>
+              <a:rPr lang="en-US" sz="2400" dirty="0">
+                <a:sym typeface="Wingdings" pitchFamily="2" charset="2"/>
+              </a:rPr>
+              <a:t> search is case-insensitive</a:t>
+            </a:r>
+          </a:p>
+          <a:p>
+            <a:pPr lvl="1"/>
+            <a:r>
+              <a:rPr lang="en-US" sz="2000" dirty="0">
+                <a:solidFill>
+                  <a:schemeClr val="accent4"/>
+                </a:solidFill>
+                <a:sym typeface="Wingdings" pitchFamily="2" charset="2"/>
+              </a:rPr>
+              <a:t>grep -</a:t>
+            </a:r>
+            <a:r>
+              <a:rPr lang="en-US" sz="2000" dirty="0" err="1">
+                <a:solidFill>
+                  <a:schemeClr val="accent4"/>
+                </a:solidFill>
+                <a:sym typeface="Wingdings" pitchFamily="2" charset="2"/>
+              </a:rPr>
+              <a:t>i</a:t>
+            </a:r>
+            <a:r>
+              <a:rPr lang="en-US" sz="2000" dirty="0">
+                <a:solidFill>
+                  <a:schemeClr val="accent4"/>
+                </a:solidFill>
+                <a:sym typeface="Wingdings" pitchFamily="2" charset="2"/>
+              </a:rPr>
+              <a:t> bird </a:t>
+            </a:r>
+            <a:r>
+              <a:rPr lang="en-US" sz="2000" dirty="0" err="1">
+                <a:solidFill>
+                  <a:schemeClr val="accent4"/>
+                </a:solidFill>
+                <a:sym typeface="Wingdings" pitchFamily="2" charset="2"/>
+              </a:rPr>
+              <a:t>my_file.txt</a:t>
+            </a:r>
+            <a:r>
+              <a:rPr lang="en-US" sz="2000" dirty="0">
+                <a:solidFill>
+                  <a:schemeClr val="accent4"/>
+                </a:solidFill>
+                <a:sym typeface="Wingdings" pitchFamily="2" charset="2"/>
+              </a:rPr>
+              <a:t> </a:t>
+            </a:r>
+            <a:r>
+              <a:rPr lang="en-US" sz="2000" dirty="0">
+                <a:sym typeface="Wingdings" pitchFamily="2" charset="2"/>
+              </a:rPr>
+              <a:t> any line that contains either the word </a:t>
+            </a:r>
+            <a:r>
+              <a:rPr lang="en-US" sz="2000" dirty="0">
+                <a:solidFill>
+                  <a:schemeClr val="tx2"/>
+                </a:solidFill>
+                <a:sym typeface="Wingdings" pitchFamily="2" charset="2"/>
+              </a:rPr>
+              <a:t>Bird</a:t>
+            </a:r>
+            <a:r>
+              <a:rPr lang="en-US" sz="2000" dirty="0">
+                <a:sym typeface="Wingdings" pitchFamily="2" charset="2"/>
+              </a:rPr>
+              <a:t> or </a:t>
+            </a:r>
+            <a:r>
+              <a:rPr lang="en-US" sz="2000" dirty="0">
+                <a:solidFill>
+                  <a:schemeClr val="tx2"/>
+                </a:solidFill>
+                <a:sym typeface="Wingdings" pitchFamily="2" charset="2"/>
+              </a:rPr>
+              <a:t>bird</a:t>
+            </a:r>
+          </a:p>
+          <a:p>
+            <a:r>
+              <a:rPr lang="en-US" sz="2400" dirty="0">
+                <a:sym typeface="Wingdings" pitchFamily="2" charset="2"/>
+              </a:rPr>
+              <a:t> </a:t>
+            </a:r>
+            <a:r>
+              <a:rPr lang="en-US" sz="2400" dirty="0">
+                <a:solidFill>
+                  <a:schemeClr val="accent4"/>
+                </a:solidFill>
+                <a:sym typeface="Wingdings" pitchFamily="2" charset="2"/>
+              </a:rPr>
+              <a:t>grep -r </a:t>
+            </a:r>
+            <a:r>
+              <a:rPr lang="en-US" sz="2400" dirty="0">
+                <a:sym typeface="Wingdings" pitchFamily="2" charset="2"/>
+              </a:rPr>
+              <a:t> search </a:t>
+            </a:r>
+            <a:r>
+              <a:rPr lang="en-US" sz="2400" i="1" dirty="0">
+                <a:sym typeface="Wingdings" pitchFamily="2" charset="2"/>
+              </a:rPr>
+              <a:t>recursively</a:t>
+            </a:r>
+            <a:r>
+              <a:rPr lang="en-US" sz="2400" dirty="0">
+                <a:sym typeface="Wingdings" pitchFamily="2" charset="2"/>
+              </a:rPr>
+              <a:t> through all files for the given pattern</a:t>
+            </a:r>
+          </a:p>
+          <a:p>
+            <a:r>
+              <a:rPr lang="en-US" sz="2400" dirty="0">
+                <a:solidFill>
+                  <a:schemeClr val="accent4"/>
+                </a:solidFill>
+                <a:sym typeface="Wingdings" pitchFamily="2" charset="2"/>
+              </a:rPr>
+              <a:t>grep -c</a:t>
+            </a:r>
+            <a:r>
+              <a:rPr lang="en-US" sz="2400" dirty="0">
+                <a:sym typeface="Wingdings" pitchFamily="2" charset="2"/>
+              </a:rPr>
+              <a:t>  count the occurrences of a pattern</a:t>
+            </a:r>
+          </a:p>
+          <a:p>
+            <a:r>
+              <a:rPr lang="en-US" sz="2400" dirty="0">
+                <a:sym typeface="Wingdings" pitchFamily="2" charset="2"/>
+              </a:rPr>
+              <a:t>options can be combined:</a:t>
+            </a:r>
+            <a:br>
+              <a:rPr lang="en-US" sz="2400" dirty="0">
+                <a:sym typeface="Wingdings" pitchFamily="2" charset="2"/>
+              </a:rPr>
+            </a:br>
+            <a:r>
+              <a:rPr lang="en-US" sz="2400" dirty="0">
+                <a:solidFill>
+                  <a:schemeClr val="accent4"/>
+                </a:solidFill>
+                <a:sym typeface="Wingdings" pitchFamily="2" charset="2"/>
+              </a:rPr>
+              <a:t>grep -r -</a:t>
+            </a:r>
+            <a:r>
+              <a:rPr lang="en-US" sz="2400" dirty="0" err="1">
+                <a:solidFill>
+                  <a:schemeClr val="accent4"/>
+                </a:solidFill>
+                <a:sym typeface="Wingdings" pitchFamily="2" charset="2"/>
+              </a:rPr>
+              <a:t>i</a:t>
+            </a:r>
+            <a:r>
+              <a:rPr lang="en-US" sz="2400" dirty="0">
+                <a:solidFill>
+                  <a:schemeClr val="accent4"/>
+                </a:solidFill>
+                <a:sym typeface="Wingdings" pitchFamily="2" charset="2"/>
+              </a:rPr>
+              <a:t> ”^Hepatitis B” </a:t>
+            </a:r>
+            <a:r>
+              <a:rPr lang="en-US" sz="2400" dirty="0">
+                <a:sym typeface="Wingdings" pitchFamily="2" charset="2"/>
+              </a:rPr>
+              <a:t> </a:t>
+            </a:r>
+            <a:r>
+              <a:rPr lang="en-US" sz="1800" dirty="0">
+                <a:sym typeface="Wingdings" pitchFamily="2" charset="2"/>
+              </a:rPr>
+              <a:t>search recursively through all files under the current working directory for occurrence of the words “Hepatitis B” at the beginning of the line </a:t>
+            </a:r>
+            <a:endParaRPr lang="en-US" sz="2400" dirty="0">
+              <a:sym typeface="Wingdings" pitchFamily="2" charset="2"/>
+            </a:endParaRPr>
+          </a:p>
+        </p:txBody>
+      </p:sp>
+    </p:spTree>
+    <p:extLst>
+      <p:ext uri="{BB962C8B-B14F-4D97-AF65-F5344CB8AC3E}">
+        <p14:creationId xmlns:p14="http://schemas.microsoft.com/office/powerpoint/2010/main" val="893129424"/>
+      </p:ext>
+    </p:extLst>
+  </p:cSld>
+  <p:clrMapOvr>
+    <a:masterClrMapping/>
+  </p:clrMapOvr>
+</p:sld>
+</file>
+
+<file path=ppt/slides/slide19.xml><?xml version="1.0" encoding="utf-8"?>
+<p:sld xmlns:a="http://schemas.openxmlformats.org/drawingml/2006/main" xmlns:r="http://schemas.openxmlformats.org/officeDocument/2006/relationships" xmlns:p="http://schemas.openxmlformats.org/presentationml/2006/main">
+  <p:cSld>
+    <p:spTree>
+      <p:nvGrpSpPr>
+        <p:cNvPr id="1" name=""/>
+        <p:cNvGrpSpPr/>
+        <p:nvPr/>
+      </p:nvGrpSpPr>
+      <p:grpSpPr>
+        <a:xfrm>
+          <a:off x="0" y="0"/>
+          <a:ext cx="0" cy="0"/>
+          <a:chOff x="0" y="0"/>
+          <a:chExt cx="0" cy="0"/>
+        </a:xfrm>
+      </p:grpSpPr>
+      <p:sp>
+        <p:nvSpPr>
+          <p:cNvPr id="2" name="Title 1">
+            <a:extLst>
+              <a:ext uri="{FF2B5EF4-FFF2-40B4-BE49-F238E27FC236}">
+                <a16:creationId xmlns:a16="http://schemas.microsoft.com/office/drawing/2014/main" id="{B85E50DD-72B8-1BF3-5526-083FC2B7BB33}"/>
+              </a:ext>
+            </a:extLst>
+          </p:cNvPr>
+          <p:cNvSpPr>
+            <a:spLocks noGrp="1"/>
+          </p:cNvSpPr>
+          <p:nvPr>
+            <p:ph type="title"/>
+          </p:nvPr>
+        </p:nvSpPr>
+        <p:spPr>
+          <a:xfrm>
+            <a:off x="250825" y="62830"/>
+            <a:ext cx="8642350" cy="420688"/>
+          </a:xfrm>
+        </p:spPr>
+        <p:txBody>
+          <a:bodyPr/>
+          <a:lstStyle/>
+          <a:p>
+            <a:r>
+              <a:rPr lang="en-US" dirty="0"/>
+              <a:t>Tools to find stuff - grep</a:t>
+            </a:r>
+            <a:endParaRPr lang="en-DE" dirty="0"/>
+          </a:p>
+        </p:txBody>
+      </p:sp>
+      <p:sp>
+        <p:nvSpPr>
+          <p:cNvPr id="3" name="Content Placeholder 2">
+            <a:extLst>
+              <a:ext uri="{FF2B5EF4-FFF2-40B4-BE49-F238E27FC236}">
+                <a16:creationId xmlns:a16="http://schemas.microsoft.com/office/drawing/2014/main" id="{5E88D3A8-7C27-2898-432C-2321FF6C788B}"/>
+              </a:ext>
+            </a:extLst>
+          </p:cNvPr>
+          <p:cNvSpPr>
+            <a:spLocks noGrp="1"/>
+          </p:cNvSpPr>
+          <p:nvPr>
+            <p:ph idx="1"/>
+          </p:nvPr>
+        </p:nvSpPr>
+        <p:spPr>
+          <a:xfrm>
+            <a:off x="250825" y="627534"/>
+            <a:ext cx="8642350" cy="3635375"/>
+          </a:xfrm>
+        </p:spPr>
+        <p:txBody>
+          <a:bodyPr/>
+          <a:lstStyle/>
+          <a:p>
+            <a:r>
+              <a:rPr lang="en-US" dirty="0"/>
+              <a:t> </a:t>
+            </a:r>
+            <a:r>
+              <a:rPr lang="en-US" sz="2400" dirty="0">
+                <a:solidFill>
+                  <a:schemeClr val="accent4"/>
+                </a:solidFill>
+              </a:rPr>
+              <a:t>grep pattern </a:t>
+            </a:r>
+            <a:r>
+              <a:rPr lang="en-US" sz="2400" dirty="0" err="1">
+                <a:solidFill>
+                  <a:schemeClr val="accent4"/>
+                </a:solidFill>
+              </a:rPr>
+              <a:t>file_name</a:t>
+            </a:r>
+            <a:r>
+              <a:rPr lang="en-US" sz="2400" dirty="0">
+                <a:solidFill>
+                  <a:schemeClr val="accent4"/>
+                </a:solidFill>
+              </a:rPr>
+              <a:t> </a:t>
+            </a:r>
+            <a:r>
+              <a:rPr lang="en-US" sz="2400" dirty="0">
+                <a:solidFill>
+                  <a:schemeClr val="tx2"/>
+                </a:solidFill>
+              </a:rPr>
+              <a:t>-A</a:t>
+            </a:r>
+            <a:r>
+              <a:rPr lang="en-US" sz="2400" dirty="0"/>
+              <a:t> 10 </a:t>
+            </a:r>
+            <a:r>
+              <a:rPr lang="en-US" sz="2400" dirty="0">
+                <a:sym typeface="Wingdings" pitchFamily="2" charset="2"/>
+              </a:rPr>
+              <a:t> print 10 lines after each found pattern </a:t>
+            </a:r>
+          </a:p>
+          <a:p>
+            <a:r>
+              <a:rPr lang="en-US" sz="2400" dirty="0"/>
+              <a:t> </a:t>
+            </a:r>
+            <a:r>
+              <a:rPr lang="en-US" sz="2400" dirty="0">
+                <a:solidFill>
+                  <a:schemeClr val="accent4"/>
+                </a:solidFill>
+              </a:rPr>
+              <a:t>grep pattern </a:t>
+            </a:r>
+            <a:r>
+              <a:rPr lang="en-US" sz="2400" dirty="0" err="1">
+                <a:solidFill>
+                  <a:schemeClr val="accent4"/>
+                </a:solidFill>
+              </a:rPr>
+              <a:t>file_name</a:t>
+            </a:r>
+            <a:r>
+              <a:rPr lang="en-US" sz="2400" dirty="0">
+                <a:solidFill>
+                  <a:schemeClr val="accent4"/>
+                </a:solidFill>
+              </a:rPr>
+              <a:t> </a:t>
+            </a:r>
+            <a:r>
+              <a:rPr lang="en-US" sz="2400" dirty="0">
+                <a:solidFill>
+                  <a:schemeClr val="tx2"/>
+                </a:solidFill>
+              </a:rPr>
+              <a:t>-B</a:t>
+            </a:r>
+            <a:r>
+              <a:rPr lang="en-US" sz="2400" dirty="0"/>
+              <a:t> 10 </a:t>
+            </a:r>
+            <a:r>
+              <a:rPr lang="en-US" sz="2400" dirty="0">
+                <a:sym typeface="Wingdings" pitchFamily="2" charset="2"/>
+              </a:rPr>
+              <a:t> print 10 lines before each found pattern </a:t>
+            </a:r>
+          </a:p>
+        </p:txBody>
+      </p:sp>
+    </p:spTree>
+    <p:extLst>
+      <p:ext uri="{BB962C8B-B14F-4D97-AF65-F5344CB8AC3E}">
+        <p14:creationId xmlns:p14="http://schemas.microsoft.com/office/powerpoint/2010/main" val="1993183708"/>
       </p:ext>
     </p:extLst>
   </p:cSld>
@@ -6618,6 +7693,773 @@
     <p:extLst>
       <p:ext uri="{BB962C8B-B14F-4D97-AF65-F5344CB8AC3E}">
         <p14:creationId xmlns:p14="http://schemas.microsoft.com/office/powerpoint/2010/main" val="2365009089"/>
+      </p:ext>
+    </p:extLst>
+  </p:cSld>
+  <p:clrMapOvr>
+    <a:masterClrMapping/>
+  </p:clrMapOvr>
+</p:sld>
+</file>
+
+<file path=ppt/slides/slide20.xml><?xml version="1.0" encoding="utf-8"?>
+<p:sld xmlns:a="http://schemas.openxmlformats.org/drawingml/2006/main" xmlns:r="http://schemas.openxmlformats.org/officeDocument/2006/relationships" xmlns:p="http://schemas.openxmlformats.org/presentationml/2006/main">
+  <p:cSld>
+    <p:spTree>
+      <p:nvGrpSpPr>
+        <p:cNvPr id="1" name=""/>
+        <p:cNvGrpSpPr/>
+        <p:nvPr/>
+      </p:nvGrpSpPr>
+      <p:grpSpPr>
+        <a:xfrm>
+          <a:off x="0" y="0"/>
+          <a:ext cx="0" cy="0"/>
+          <a:chOff x="0" y="0"/>
+          <a:chExt cx="0" cy="0"/>
+        </a:xfrm>
+      </p:grpSpPr>
+      <p:sp>
+        <p:nvSpPr>
+          <p:cNvPr id="2" name="Title 1">
+            <a:extLst>
+              <a:ext uri="{FF2B5EF4-FFF2-40B4-BE49-F238E27FC236}">
+                <a16:creationId xmlns:a16="http://schemas.microsoft.com/office/drawing/2014/main" id="{7DFACC50-6C72-AF9A-1AC0-007293A7EB71}"/>
+              </a:ext>
+            </a:extLst>
+          </p:cNvPr>
+          <p:cNvSpPr>
+            <a:spLocks noGrp="1"/>
+          </p:cNvSpPr>
+          <p:nvPr>
+            <p:ph type="title"/>
+          </p:nvPr>
+        </p:nvSpPr>
+        <p:spPr/>
+        <p:txBody>
+          <a:bodyPr/>
+          <a:lstStyle/>
+          <a:p>
+            <a:r>
+              <a:rPr lang="en-US" dirty="0"/>
+              <a:t>grep demo</a:t>
+            </a:r>
+          </a:p>
+        </p:txBody>
+      </p:sp>
+      <p:sp>
+        <p:nvSpPr>
+          <p:cNvPr id="3" name="Content Placeholder 2">
+            <a:extLst>
+              <a:ext uri="{FF2B5EF4-FFF2-40B4-BE49-F238E27FC236}">
+                <a16:creationId xmlns:a16="http://schemas.microsoft.com/office/drawing/2014/main" id="{A264B2A1-7E31-4B96-4A01-79BD96238506}"/>
+              </a:ext>
+            </a:extLst>
+          </p:cNvPr>
+          <p:cNvSpPr>
+            <a:spLocks noGrp="1"/>
+          </p:cNvSpPr>
+          <p:nvPr>
+            <p:ph idx="1"/>
+          </p:nvPr>
+        </p:nvSpPr>
+        <p:spPr/>
+        <p:txBody>
+          <a:bodyPr/>
+          <a:lstStyle/>
+          <a:p>
+            <a:r>
+              <a:rPr lang="en-US" dirty="0"/>
+              <a:t>grep in </a:t>
+            </a:r>
+            <a:r>
+              <a:rPr lang="en-US" dirty="0" err="1"/>
+              <a:t>fastqs</a:t>
+            </a:r>
+            <a:endParaRPr lang="en-US" dirty="0"/>
+          </a:p>
+          <a:p>
+            <a:r>
+              <a:rPr lang="en-US" dirty="0"/>
+              <a:t>grep in </a:t>
+            </a:r>
+            <a:r>
+              <a:rPr lang="en-US" dirty="0" err="1"/>
+              <a:t>bih</a:t>
+            </a:r>
+            <a:r>
+              <a:rPr lang="en-US" dirty="0"/>
+              <a:t>-pipeline</a:t>
+            </a:r>
+          </a:p>
+          <a:p>
+            <a:r>
+              <a:rPr lang="en-US" dirty="0"/>
+              <a:t>grep in protein-database</a:t>
+            </a:r>
+          </a:p>
+        </p:txBody>
+      </p:sp>
+    </p:spTree>
+    <p:extLst>
+      <p:ext uri="{BB962C8B-B14F-4D97-AF65-F5344CB8AC3E}">
+        <p14:creationId xmlns:p14="http://schemas.microsoft.com/office/powerpoint/2010/main" val="3676408805"/>
+      </p:ext>
+    </p:extLst>
+  </p:cSld>
+  <p:clrMapOvr>
+    <a:masterClrMapping/>
+  </p:clrMapOvr>
+</p:sld>
+</file>
+
+<file path=ppt/slides/slide21.xml><?xml version="1.0" encoding="utf-8"?>
+<p:sld xmlns:a="http://schemas.openxmlformats.org/drawingml/2006/main" xmlns:r="http://schemas.openxmlformats.org/officeDocument/2006/relationships" xmlns:p="http://schemas.openxmlformats.org/presentationml/2006/main">
+  <p:cSld>
+    <p:spTree>
+      <p:nvGrpSpPr>
+        <p:cNvPr id="1" name=""/>
+        <p:cNvGrpSpPr/>
+        <p:nvPr/>
+      </p:nvGrpSpPr>
+      <p:grpSpPr>
+        <a:xfrm>
+          <a:off x="0" y="0"/>
+          <a:ext cx="0" cy="0"/>
+          <a:chOff x="0" y="0"/>
+          <a:chExt cx="0" cy="0"/>
+        </a:xfrm>
+      </p:grpSpPr>
+      <p:sp>
+        <p:nvSpPr>
+          <p:cNvPr id="2" name="Title 1">
+            <a:extLst>
+              <a:ext uri="{FF2B5EF4-FFF2-40B4-BE49-F238E27FC236}">
+                <a16:creationId xmlns:a16="http://schemas.microsoft.com/office/drawing/2014/main" id="{7DFACC50-6C72-AF9A-1AC0-007293A7EB71}"/>
+              </a:ext>
+            </a:extLst>
+          </p:cNvPr>
+          <p:cNvSpPr>
+            <a:spLocks noGrp="1"/>
+          </p:cNvSpPr>
+          <p:nvPr>
+            <p:ph type="title"/>
+          </p:nvPr>
+        </p:nvSpPr>
+        <p:spPr/>
+        <p:txBody>
+          <a:bodyPr/>
+          <a:lstStyle/>
+          <a:p>
+            <a:r>
+              <a:rPr lang="en-US" dirty="0"/>
+              <a:t>find</a:t>
+            </a:r>
+          </a:p>
+        </p:txBody>
+      </p:sp>
+      <p:sp>
+        <p:nvSpPr>
+          <p:cNvPr id="3" name="Content Placeholder 2">
+            <a:extLst>
+              <a:ext uri="{FF2B5EF4-FFF2-40B4-BE49-F238E27FC236}">
+                <a16:creationId xmlns:a16="http://schemas.microsoft.com/office/drawing/2014/main" id="{A264B2A1-7E31-4B96-4A01-79BD96238506}"/>
+              </a:ext>
+            </a:extLst>
+          </p:cNvPr>
+          <p:cNvSpPr>
+            <a:spLocks noGrp="1"/>
+          </p:cNvSpPr>
+          <p:nvPr>
+            <p:ph idx="1"/>
+          </p:nvPr>
+        </p:nvSpPr>
+        <p:spPr/>
+        <p:txBody>
+          <a:bodyPr/>
+          <a:lstStyle/>
+          <a:p>
+            <a:r>
+              <a:rPr lang="en-US" dirty="0">
+                <a:solidFill>
+                  <a:schemeClr val="accent4"/>
+                </a:solidFill>
+              </a:rPr>
+              <a:t>find</a:t>
+            </a:r>
+            <a:r>
+              <a:rPr lang="en-US" dirty="0"/>
+              <a:t> lists all files and directories underneath the given path</a:t>
+            </a:r>
+          </a:p>
+          <a:p>
+            <a:r>
+              <a:rPr lang="en-US" dirty="0">
+                <a:solidFill>
+                  <a:schemeClr val="accent4"/>
+                </a:solidFill>
+              </a:rPr>
+              <a:t>find / </a:t>
+            </a:r>
+            <a:r>
+              <a:rPr lang="en-US" dirty="0">
+                <a:sym typeface="Wingdings" pitchFamily="2" charset="2"/>
+              </a:rPr>
+              <a:t></a:t>
+            </a:r>
+            <a:r>
+              <a:rPr lang="en-US" dirty="0">
+                <a:solidFill>
+                  <a:schemeClr val="accent4"/>
+                </a:solidFill>
+                <a:sym typeface="Wingdings" pitchFamily="2" charset="2"/>
+              </a:rPr>
+              <a:t> </a:t>
+            </a:r>
+            <a:r>
+              <a:rPr lang="en-US" dirty="0">
+                <a:sym typeface="Wingdings" pitchFamily="2" charset="2"/>
+              </a:rPr>
+              <a:t>list all directories and files under </a:t>
+            </a:r>
+            <a:r>
+              <a:rPr lang="en-US" i="1" dirty="0">
+                <a:sym typeface="Wingdings" pitchFamily="2" charset="2"/>
+              </a:rPr>
+              <a:t>root</a:t>
+            </a:r>
+            <a:endParaRPr lang="en-US" i="1" dirty="0"/>
+          </a:p>
+          <a:p>
+            <a:r>
+              <a:rPr lang="en-US" dirty="0">
+                <a:solidFill>
+                  <a:schemeClr val="accent4"/>
+                </a:solidFill>
+              </a:rPr>
+              <a:t>find / -type d </a:t>
+            </a:r>
+            <a:r>
+              <a:rPr lang="en-US" dirty="0">
+                <a:sym typeface="Wingdings" pitchFamily="2" charset="2"/>
+              </a:rPr>
+              <a:t></a:t>
+            </a:r>
+            <a:r>
+              <a:rPr lang="en-US" dirty="0">
+                <a:solidFill>
+                  <a:schemeClr val="accent4"/>
+                </a:solidFill>
+                <a:sym typeface="Wingdings" pitchFamily="2" charset="2"/>
+              </a:rPr>
+              <a:t> </a:t>
+            </a:r>
+            <a:r>
+              <a:rPr lang="en-US" dirty="0">
+                <a:sym typeface="Wingdings" pitchFamily="2" charset="2"/>
+              </a:rPr>
+              <a:t>list all directories under </a:t>
+            </a:r>
+            <a:r>
+              <a:rPr lang="en-US" i="1" dirty="0">
+                <a:sym typeface="Wingdings" pitchFamily="2" charset="2"/>
+              </a:rPr>
+              <a:t>root</a:t>
+            </a:r>
+            <a:endParaRPr lang="en-US" dirty="0">
+              <a:solidFill>
+                <a:schemeClr val="accent4"/>
+              </a:solidFill>
+            </a:endParaRPr>
+          </a:p>
+          <a:p>
+            <a:r>
+              <a:rPr lang="en-US" dirty="0">
+                <a:solidFill>
+                  <a:schemeClr val="accent4"/>
+                </a:solidFill>
+              </a:rPr>
+              <a:t>find / -type f </a:t>
+            </a:r>
+            <a:r>
+              <a:rPr lang="en-US" dirty="0">
+                <a:sym typeface="Wingdings" pitchFamily="2" charset="2"/>
+              </a:rPr>
+              <a:t></a:t>
+            </a:r>
+            <a:r>
+              <a:rPr lang="en-US" dirty="0">
+                <a:solidFill>
+                  <a:schemeClr val="accent4"/>
+                </a:solidFill>
+                <a:sym typeface="Wingdings" pitchFamily="2" charset="2"/>
+              </a:rPr>
+              <a:t> </a:t>
+            </a:r>
+            <a:r>
+              <a:rPr lang="en-US" dirty="0">
+                <a:sym typeface="Wingdings" pitchFamily="2" charset="2"/>
+              </a:rPr>
+              <a:t>list all files under </a:t>
+            </a:r>
+            <a:r>
+              <a:rPr lang="en-US" i="1" dirty="0">
+                <a:sym typeface="Wingdings" pitchFamily="2" charset="2"/>
+              </a:rPr>
+              <a:t>root</a:t>
+            </a:r>
+            <a:endParaRPr lang="en-US" dirty="0">
+              <a:solidFill>
+                <a:schemeClr val="accent4"/>
+              </a:solidFill>
+            </a:endParaRPr>
+          </a:p>
+          <a:p>
+            <a:r>
+              <a:rPr lang="en-US" dirty="0">
+                <a:solidFill>
+                  <a:schemeClr val="accent4"/>
+                </a:solidFill>
+              </a:rPr>
+              <a:t>find / -type f -name ‘*.</a:t>
+            </a:r>
+            <a:r>
+              <a:rPr lang="en-US" dirty="0" err="1">
+                <a:solidFill>
+                  <a:schemeClr val="accent4"/>
+                </a:solidFill>
+              </a:rPr>
+              <a:t>fastq.gz</a:t>
+            </a:r>
+            <a:r>
+              <a:rPr lang="en-US" dirty="0">
+                <a:solidFill>
+                  <a:schemeClr val="accent4"/>
+                </a:solidFill>
+              </a:rPr>
+              <a:t>’ </a:t>
+            </a:r>
+            <a:r>
+              <a:rPr lang="en-US" sz="1800" dirty="0">
+                <a:sym typeface="Wingdings" pitchFamily="2" charset="2"/>
+              </a:rPr>
+              <a:t> </a:t>
+            </a:r>
+            <a:r>
+              <a:rPr lang="en-US" sz="1400" dirty="0">
+                <a:sym typeface="Wingdings" pitchFamily="2" charset="2"/>
+              </a:rPr>
+              <a:t>all files that end on </a:t>
+            </a:r>
+            <a:r>
+              <a:rPr lang="en-US" sz="1400" dirty="0" err="1">
+                <a:sym typeface="Wingdings" pitchFamily="2" charset="2"/>
+              </a:rPr>
+              <a:t>fastq.gz</a:t>
+            </a:r>
+            <a:r>
+              <a:rPr lang="en-US" sz="1400" dirty="0">
+                <a:sym typeface="Wingdings" pitchFamily="2" charset="2"/>
+              </a:rPr>
+              <a:t> under root</a:t>
+            </a:r>
+            <a:endParaRPr lang="en-US" dirty="0"/>
+          </a:p>
+          <a:p>
+            <a:r>
+              <a:rPr lang="en-US" dirty="0"/>
+              <a:t>Many more options, quick tutorial </a:t>
+            </a:r>
+            <a:r>
+              <a:rPr lang="en-US" dirty="0">
+                <a:solidFill>
+                  <a:schemeClr val="accent4"/>
+                </a:solidFill>
+                <a:hlinkClick r:id="rId2"/>
+              </a:rPr>
+              <a:t>here</a:t>
+            </a:r>
+            <a:endParaRPr lang="en-US" dirty="0">
+              <a:solidFill>
+                <a:schemeClr val="accent4"/>
+              </a:solidFill>
+            </a:endParaRPr>
+          </a:p>
+        </p:txBody>
+      </p:sp>
+    </p:spTree>
+    <p:extLst>
+      <p:ext uri="{BB962C8B-B14F-4D97-AF65-F5344CB8AC3E}">
+        <p14:creationId xmlns:p14="http://schemas.microsoft.com/office/powerpoint/2010/main" val="316686214"/>
+      </p:ext>
+    </p:extLst>
+  </p:cSld>
+  <p:clrMapOvr>
+    <a:masterClrMapping/>
+  </p:clrMapOvr>
+</p:sld>
+</file>
+
+<file path=ppt/slides/slide22.xml><?xml version="1.0" encoding="utf-8"?>
+<p:sld xmlns:a="http://schemas.openxmlformats.org/drawingml/2006/main" xmlns:r="http://schemas.openxmlformats.org/officeDocument/2006/relationships" xmlns:p="http://schemas.openxmlformats.org/presentationml/2006/main">
+  <p:cSld>
+    <p:spTree>
+      <p:nvGrpSpPr>
+        <p:cNvPr id="1" name=""/>
+        <p:cNvGrpSpPr/>
+        <p:nvPr/>
+      </p:nvGrpSpPr>
+      <p:grpSpPr>
+        <a:xfrm>
+          <a:off x="0" y="0"/>
+          <a:ext cx="0" cy="0"/>
+          <a:chOff x="0" y="0"/>
+          <a:chExt cx="0" cy="0"/>
+        </a:xfrm>
+      </p:grpSpPr>
+      <p:sp>
+        <p:nvSpPr>
+          <p:cNvPr id="2" name="Title 1">
+            <a:extLst>
+              <a:ext uri="{FF2B5EF4-FFF2-40B4-BE49-F238E27FC236}">
+                <a16:creationId xmlns:a16="http://schemas.microsoft.com/office/drawing/2014/main" id="{CC48BE76-4229-CE5F-3044-D136C83693E0}"/>
+              </a:ext>
+            </a:extLst>
+          </p:cNvPr>
+          <p:cNvSpPr>
+            <a:spLocks noGrp="1"/>
+          </p:cNvSpPr>
+          <p:nvPr>
+            <p:ph type="title"/>
+          </p:nvPr>
+        </p:nvSpPr>
+        <p:spPr/>
+        <p:txBody>
+          <a:bodyPr/>
+          <a:lstStyle/>
+          <a:p>
+            <a:r>
+              <a:rPr lang="en-US" dirty="0"/>
+              <a:t>Quick exercise round</a:t>
+            </a:r>
+          </a:p>
+        </p:txBody>
+      </p:sp>
+      <p:sp>
+        <p:nvSpPr>
+          <p:cNvPr id="3" name="Content Placeholder 2">
+            <a:extLst>
+              <a:ext uri="{FF2B5EF4-FFF2-40B4-BE49-F238E27FC236}">
+                <a16:creationId xmlns:a16="http://schemas.microsoft.com/office/drawing/2014/main" id="{1E548A36-DFC7-F982-B6FD-60E5175A09CB}"/>
+              </a:ext>
+            </a:extLst>
+          </p:cNvPr>
+          <p:cNvSpPr>
+            <a:spLocks noGrp="1"/>
+          </p:cNvSpPr>
+          <p:nvPr>
+            <p:ph idx="1"/>
+          </p:nvPr>
+        </p:nvSpPr>
+        <p:spPr/>
+        <p:txBody>
+          <a:bodyPr/>
+          <a:lstStyle/>
+          <a:p>
+            <a:r>
+              <a:rPr lang="en-US" dirty="0"/>
+              <a:t>grep for the word </a:t>
+            </a:r>
+            <a:r>
+              <a:rPr lang="en-US" dirty="0">
+                <a:solidFill>
+                  <a:schemeClr val="tx2"/>
+                </a:solidFill>
+              </a:rPr>
+              <a:t>hepatitis</a:t>
+            </a:r>
+            <a:r>
+              <a:rPr lang="en-US" dirty="0"/>
+              <a:t> in the </a:t>
+            </a:r>
+            <a:r>
+              <a:rPr lang="en-US" dirty="0" err="1">
+                <a:solidFill>
+                  <a:schemeClr val="accent4"/>
+                </a:solidFill>
+              </a:rPr>
+              <a:t>protein_ref.faa</a:t>
+            </a:r>
+            <a:r>
+              <a:rPr lang="en-US" dirty="0">
+                <a:solidFill>
+                  <a:schemeClr val="accent4"/>
+                </a:solidFill>
+              </a:rPr>
+              <a:t> </a:t>
+            </a:r>
+            <a:r>
+              <a:rPr lang="en-US" dirty="0"/>
+              <a:t>file </a:t>
+            </a:r>
+          </a:p>
+          <a:p>
+            <a:r>
+              <a:rPr lang="en-US" dirty="0"/>
+              <a:t>grep for the word </a:t>
+            </a:r>
+            <a:r>
+              <a:rPr lang="en-US" dirty="0">
+                <a:solidFill>
+                  <a:schemeClr val="tx2"/>
+                </a:solidFill>
+              </a:rPr>
+              <a:t>hepatitis</a:t>
+            </a:r>
+            <a:r>
+              <a:rPr lang="en-US" dirty="0"/>
+              <a:t> or </a:t>
+            </a:r>
+            <a:r>
+              <a:rPr lang="en-US" dirty="0">
+                <a:solidFill>
+                  <a:schemeClr val="tx2"/>
+                </a:solidFill>
+              </a:rPr>
+              <a:t>Hepatitis </a:t>
+            </a:r>
+            <a:r>
+              <a:rPr lang="en-US" dirty="0"/>
+              <a:t>in the </a:t>
+            </a:r>
+            <a:r>
+              <a:rPr lang="en-US" dirty="0" err="1">
+                <a:solidFill>
+                  <a:schemeClr val="accent4"/>
+                </a:solidFill>
+              </a:rPr>
+              <a:t>protein_ref.faa</a:t>
+            </a:r>
+            <a:r>
+              <a:rPr lang="en-US" dirty="0">
+                <a:solidFill>
+                  <a:schemeClr val="accent4"/>
+                </a:solidFill>
+              </a:rPr>
+              <a:t> </a:t>
+            </a:r>
+            <a:r>
+              <a:rPr lang="en-US" dirty="0"/>
+              <a:t>file </a:t>
+            </a:r>
+          </a:p>
+          <a:p>
+            <a:r>
+              <a:rPr lang="en-US" dirty="0"/>
+              <a:t>grep for the words </a:t>
+            </a:r>
+            <a:r>
+              <a:rPr lang="en-US" dirty="0">
+                <a:solidFill>
+                  <a:schemeClr val="tx2"/>
+                </a:solidFill>
+              </a:rPr>
+              <a:t>hepatitis c</a:t>
+            </a:r>
+            <a:r>
+              <a:rPr lang="en-US" dirty="0"/>
+              <a:t> or </a:t>
+            </a:r>
+            <a:r>
+              <a:rPr lang="en-US" dirty="0">
+                <a:solidFill>
+                  <a:schemeClr val="tx2"/>
+                </a:solidFill>
+              </a:rPr>
+              <a:t>Hepatitis C </a:t>
+            </a:r>
+            <a:r>
+              <a:rPr lang="en-US" dirty="0"/>
+              <a:t>in the </a:t>
+            </a:r>
+            <a:r>
+              <a:rPr lang="en-US" dirty="0" err="1">
+                <a:solidFill>
+                  <a:schemeClr val="accent4"/>
+                </a:solidFill>
+              </a:rPr>
+              <a:t>protein_ref.faa</a:t>
+            </a:r>
+            <a:r>
+              <a:rPr lang="en-US" dirty="0">
+                <a:solidFill>
+                  <a:schemeClr val="accent4"/>
+                </a:solidFill>
+              </a:rPr>
+              <a:t> </a:t>
+            </a:r>
+            <a:r>
+              <a:rPr lang="en-US" dirty="0"/>
+              <a:t>file </a:t>
+            </a:r>
+          </a:p>
+          <a:p>
+            <a:r>
+              <a:rPr lang="en-US" dirty="0"/>
+              <a:t>grep only for the header line of each </a:t>
+            </a:r>
+            <a:r>
+              <a:rPr lang="en-US" dirty="0" err="1"/>
+              <a:t>fasta</a:t>
+            </a:r>
+            <a:r>
+              <a:rPr lang="en-US" dirty="0"/>
+              <a:t> entry</a:t>
+            </a:r>
+          </a:p>
+          <a:p>
+            <a:pPr lvl="1"/>
+            <a:r>
+              <a:rPr lang="en-US" dirty="0"/>
+              <a:t>the header always starts with “&gt;”</a:t>
+            </a:r>
+          </a:p>
+        </p:txBody>
+      </p:sp>
+    </p:spTree>
+    <p:extLst>
+      <p:ext uri="{BB962C8B-B14F-4D97-AF65-F5344CB8AC3E}">
+        <p14:creationId xmlns:p14="http://schemas.microsoft.com/office/powerpoint/2010/main" val="2090834353"/>
+      </p:ext>
+    </p:extLst>
+  </p:cSld>
+  <p:clrMapOvr>
+    <a:masterClrMapping/>
+  </p:clrMapOvr>
+</p:sld>
+</file>
+
+<file path=ppt/slides/slide23.xml><?xml version="1.0" encoding="utf-8"?>
+<p:sld xmlns:a="http://schemas.openxmlformats.org/drawingml/2006/main" xmlns:r="http://schemas.openxmlformats.org/officeDocument/2006/relationships" xmlns:p="http://schemas.openxmlformats.org/presentationml/2006/main">
+  <p:cSld>
+    <p:spTree>
+      <p:nvGrpSpPr>
+        <p:cNvPr id="1" name=""/>
+        <p:cNvGrpSpPr/>
+        <p:nvPr/>
+      </p:nvGrpSpPr>
+      <p:grpSpPr>
+        <a:xfrm>
+          <a:off x="0" y="0"/>
+          <a:ext cx="0" cy="0"/>
+          <a:chOff x="0" y="0"/>
+          <a:chExt cx="0" cy="0"/>
+        </a:xfrm>
+      </p:grpSpPr>
+      <p:sp>
+        <p:nvSpPr>
+          <p:cNvPr id="2" name="Title 1">
+            <a:extLst>
+              <a:ext uri="{FF2B5EF4-FFF2-40B4-BE49-F238E27FC236}">
+                <a16:creationId xmlns:a16="http://schemas.microsoft.com/office/drawing/2014/main" id="{CC48BE76-4229-CE5F-3044-D136C83693E0}"/>
+              </a:ext>
+            </a:extLst>
+          </p:cNvPr>
+          <p:cNvSpPr>
+            <a:spLocks noGrp="1"/>
+          </p:cNvSpPr>
+          <p:nvPr>
+            <p:ph type="title"/>
+          </p:nvPr>
+        </p:nvSpPr>
+        <p:spPr/>
+        <p:txBody>
+          <a:bodyPr/>
+          <a:lstStyle/>
+          <a:p>
+            <a:r>
+              <a:rPr lang="en-US" dirty="0"/>
+              <a:t>Quick exercise round</a:t>
+            </a:r>
+          </a:p>
+        </p:txBody>
+      </p:sp>
+      <p:sp>
+        <p:nvSpPr>
+          <p:cNvPr id="3" name="Content Placeholder 2">
+            <a:extLst>
+              <a:ext uri="{FF2B5EF4-FFF2-40B4-BE49-F238E27FC236}">
+                <a16:creationId xmlns:a16="http://schemas.microsoft.com/office/drawing/2014/main" id="{1E548A36-DFC7-F982-B6FD-60E5175A09CB}"/>
+              </a:ext>
+            </a:extLst>
+          </p:cNvPr>
+          <p:cNvSpPr>
+            <a:spLocks noGrp="1"/>
+          </p:cNvSpPr>
+          <p:nvPr>
+            <p:ph idx="1"/>
+          </p:nvPr>
+        </p:nvSpPr>
+        <p:spPr/>
+        <p:txBody>
+          <a:bodyPr/>
+          <a:lstStyle/>
+          <a:p>
+            <a:r>
+              <a:rPr lang="en-US" dirty="0"/>
+              <a:t>Use grep to extract the </a:t>
+            </a:r>
+            <a:r>
+              <a:rPr lang="en-US" dirty="0" err="1"/>
+              <a:t>fasta</a:t>
+            </a:r>
+            <a:r>
+              <a:rPr lang="en-US" dirty="0"/>
+              <a:t> header file from the </a:t>
+            </a:r>
+            <a:r>
+              <a:rPr lang="en-US" dirty="0" err="1">
+                <a:solidFill>
+                  <a:schemeClr val="accent4"/>
+                </a:solidFill>
+              </a:rPr>
+              <a:t>protein_ref.faa</a:t>
+            </a:r>
+            <a:r>
+              <a:rPr lang="en-US" dirty="0"/>
+              <a:t> file and write the headers into a file called </a:t>
+            </a:r>
+            <a:r>
+              <a:rPr lang="en-US" dirty="0" err="1"/>
+              <a:t>fasta_headers.txt</a:t>
+            </a:r>
+            <a:endParaRPr lang="en-US" dirty="0"/>
+          </a:p>
+          <a:p>
+            <a:r>
+              <a:rPr lang="en-US" dirty="0"/>
+              <a:t>Bonus: </a:t>
+            </a:r>
+            <a:br>
+              <a:rPr lang="en-US" dirty="0"/>
+            </a:br>
+            <a:r>
+              <a:rPr lang="en-US" dirty="0"/>
+              <a:t>in which genome does the amino acid sequence CSGSWLRDIWDWICEVL occur?</a:t>
+            </a:r>
+          </a:p>
+          <a:p>
+            <a:pPr marL="457200" lvl="1" indent="0">
+              <a:buNone/>
+            </a:pPr>
+            <a:endParaRPr lang="en-US" dirty="0"/>
+          </a:p>
+        </p:txBody>
+      </p:sp>
+    </p:spTree>
+    <p:extLst>
+      <p:ext uri="{BB962C8B-B14F-4D97-AF65-F5344CB8AC3E}">
+        <p14:creationId xmlns:p14="http://schemas.microsoft.com/office/powerpoint/2010/main" val="948978468"/>
       </p:ext>
     </p:extLst>
   </p:cSld>
@@ -7849,11 +9691,29 @@
             </a:r>
             <a:r>
               <a:rPr lang="en-US" dirty="0" err="1"/>
-              <a:t>zcat</a:t>
-            </a:r>
-            <a:r>
-              <a:rPr lang="en-US" dirty="0"/>
-              <a:t>, head, tail (-n), less</a:t>
+              <a:t>zca</a:t>
+            </a:r>
+            <a:r>
+              <a:rPr lang="en-US" dirty="0"/>
+              <a:t>	t, head, tail (-n), less</a:t>
+            </a:r>
+          </a:p>
+          <a:p>
+            <a:r>
+              <a:rPr lang="en-US" dirty="0"/>
+              <a:t>Autocomplete by hitting the tab </a:t>
+            </a:r>
+          </a:p>
+          <a:p>
+            <a:r>
+              <a:rPr lang="en-US" dirty="0"/>
+              <a:t>Ctrl-A/Ctrl-E go to beginning/end of a line</a:t>
+            </a:r>
+          </a:p>
+          <a:p>
+            <a:r>
+              <a:rPr lang="en-US" dirty="0"/>
+              <a:t>Ctrl-R reverse-history search</a:t>
             </a:r>
           </a:p>
         </p:txBody>

</xml_diff>

<commit_message>
final version including all slides from me and therese
</commit_message>
<xml_diff>
--- a/slides/ghana_linux_basics.pptx
+++ b/slides/ghana_linux_basics.pptx
@@ -6712,7 +6712,7 @@
           <a:p>
             <a:r>
               <a:rPr lang="en-US" dirty="0"/>
-              <a:t>”pattern” can be a lot of things</a:t>
+              <a:t>”pattern” can be a lot of things </a:t>
             </a:r>
           </a:p>
           <a:p>
@@ -6723,7 +6723,23 @@
                   <a:schemeClr val="accent4"/>
                 </a:solidFill>
               </a:rPr>
-              <a:t>“^hepatitis”</a:t>
+              <a:t>“</a:t>
+            </a:r>
+            <a:r>
+              <a:rPr lang="en-US" dirty="0">
+                <a:solidFill>
+                  <a:schemeClr val="tx2"/>
+                </a:solidFill>
+              </a:rPr>
+              <a:t>^</a:t>
+            </a:r>
+            <a:r>
+              <a:rPr lang="en-US" dirty="0">
+                <a:solidFill>
+                  <a:schemeClr val="accent4"/>
+                </a:solidFill>
+              </a:rPr>
+              <a:t>hepatitis”</a:t>
             </a:r>
             <a:r>
               <a:rPr lang="en-US" dirty="0"/>
@@ -6745,7 +6761,25 @@
                 </a:solidFill>
                 <a:sym typeface="Wingdings" pitchFamily="2" charset="2"/>
               </a:rPr>
-              <a:t>“hepatitis$” </a:t>
+              <a:t>“hepatitis</a:t>
+            </a:r>
+            <a:r>
+              <a:rPr lang="en-US" dirty="0">
+                <a:solidFill>
+                  <a:schemeClr val="tx2"/>
+                </a:solidFill>
+                <a:sym typeface="Wingdings" pitchFamily="2" charset="2"/>
+              </a:rPr>
+              <a:t>$</a:t>
+            </a:r>
+            <a:r>
+              <a:rPr lang="en-US" dirty="0">
+                <a:solidFill>
+                  <a:schemeClr val="accent4"/>
+                </a:solidFill>
+                <a:sym typeface="Wingdings" pitchFamily="2" charset="2"/>
+              </a:rPr>
+              <a:t>” </a:t>
             </a:r>
             <a:r>
               <a:rPr lang="en-US" dirty="0">
@@ -8322,6 +8356,25 @@
             <a:r>
               <a:rPr lang="en-US" dirty="0"/>
               <a:t>the header always starts with “&gt;”</a:t>
+            </a:r>
+          </a:p>
+          <a:p>
+            <a:pPr lvl="1"/>
+            <a:r>
+              <a:rPr lang="en-US" dirty="0"/>
+              <a:t>Using </a:t>
+            </a:r>
+            <a:r>
+              <a:rPr lang="en-US" dirty="0">
+                <a:solidFill>
+                  <a:schemeClr val="tx2"/>
+                </a:solidFill>
+              </a:rPr>
+              <a:t>^ </a:t>
+            </a:r>
+            <a:r>
+              <a:rPr lang="en-US" dirty="0"/>
+              <a:t>tells grep to only look for the occurrence at the beginning</a:t>
             </a:r>
           </a:p>
         </p:txBody>

</xml_diff>